<commit_message>
Added Anisble support and verified hyper-v installation
</commit_message>
<xml_diff>
--- a/Dev Ops Course - Desktop Setup.pptx
+++ b/Dev Ops Course - Desktop Setup.pptx
@@ -32,6 +32,8 @@
     <p:sldId id="277" r:id="rId27"/>
     <p:sldId id="278" r:id="rId28"/>
     <p:sldId id="279" r:id="rId29"/>
+    <p:sldId id="280" r:id="rId30"/>
+    <p:sldId id="281" r:id="rId31"/>
   </p:sldIdLst>
   <p:sldSz cx="9144000" cy="6858000"/>
   <p:notesSz cx="7772400" cy="10058400"/>
@@ -6431,7 +6433,7 @@
         <p:spPr>
           <a:xfrm>
             <a:off x="-71640" y="3240000"/>
-            <a:ext cx="9139680" cy="3568680"/>
+            <a:ext cx="9138600" cy="3567600"/>
           </a:xfrm>
           <a:prstGeom prst="rect">
             <a:avLst/>
@@ -6558,7 +6560,7 @@
         <p:spPr>
           <a:xfrm>
             <a:off x="3311640" y="1268640"/>
-            <a:ext cx="2264040" cy="661320"/>
+            <a:ext cx="2262960" cy="660240"/>
           </a:xfrm>
           <a:prstGeom prst="rect">
             <a:avLst/>
@@ -6633,7 +6635,7 @@
         <p:spPr>
           <a:xfrm>
             <a:off x="504000" y="1413360"/>
-            <a:ext cx="8275680" cy="5215680"/>
+            <a:ext cx="8274600" cy="5214600"/>
           </a:xfrm>
           <a:prstGeom prst="rect">
             <a:avLst/>
@@ -6837,7 +6839,7 @@
         <p:spPr>
           <a:xfrm>
             <a:off x="432000" y="0"/>
-            <a:ext cx="7448040" cy="1180080"/>
+            <a:ext cx="7446960" cy="1179000"/>
           </a:xfrm>
           <a:prstGeom prst="rect">
             <a:avLst/>
@@ -6908,7 +6910,7 @@
         <p:spPr>
           <a:xfrm>
             <a:off x="0" y="0"/>
-            <a:ext cx="247320" cy="1192320"/>
+            <a:ext cx="246240" cy="1191240"/>
           </a:xfrm>
           <a:prstGeom prst="rect">
             <a:avLst/>
@@ -7034,7 +7036,7 @@
         <p:spPr>
           <a:xfrm>
             <a:off x="504000" y="1413360"/>
-            <a:ext cx="8275680" cy="5215680"/>
+            <a:ext cx="8274600" cy="5214600"/>
           </a:xfrm>
           <a:prstGeom prst="rect">
             <a:avLst/>
@@ -7130,7 +7132,7 @@
                 <a:latin typeface="Calibri"/>
                 <a:ea typeface="DejaVu Sans"/>
               </a:rPr>
-              <a:t>There are sometimes issues getting VirtualBox working on a windows host.  As a work-around, please use Hyper-V as a second option.  </a:t>
+              <a:t>There are sometimes issues getting VirtualBox working on a windows host.  As a work-around, please use Hyper-V as a second option.</a:t>
             </a:r>
             <a:endParaRPr b="0" lang="en-CA" sz="2400" spc="-1" strike="noStrike">
               <a:latin typeface="Arial"/>
@@ -7159,34 +7161,14 @@
               </a:spcBef>
             </a:pPr>
             <a:r>
-              <a:rPr b="0" lang="en-CA" sz="2400" spc="-1" strike="noStrike">
+              <a:rPr b="1" lang="en-CA" sz="2400" spc="-1" strike="noStrike">
                 <a:solidFill>
                   <a:srgbClr val="000000"/>
                 </a:solidFill>
                 <a:latin typeface="Calibri"/>
                 <a:ea typeface="DejaVu Sans"/>
               </a:rPr>
-              <a:t>1)</a:t>
-            </a:r>
-            <a:r>
-              <a:rPr b="0" lang="en-CA" sz="2400" spc="-1" strike="noStrike">
-                <a:solidFill>
-                  <a:srgbClr val="000000"/>
-                </a:solidFill>
-                <a:latin typeface="Calibri"/>
-                <a:ea typeface="DejaVu Sans"/>
-              </a:rPr>
-              <a:t>	</a:t>
-            </a:r>
-            <a:r>
-              <a:rPr b="0" lang="en-CA" sz="2400" spc="-1" strike="noStrike">
-                <a:solidFill>
-                  <a:srgbClr val="000000"/>
-                </a:solidFill>
-                <a:latin typeface="Calibri"/>
-                <a:ea typeface="DejaVu Sans"/>
-              </a:rPr>
-              <a:t>To Install Linux 19.04 inside of Hyper-V:</a:t>
+              <a:t>Note:  Ubuntu 19.04 no longer has updates.  We will be using the image without an upgrade.  Please follow the directions below.</a:t>
             </a:r>
             <a:endParaRPr b="0" lang="en-CA" sz="2400" spc="-1" strike="noStrike">
               <a:latin typeface="Arial"/>
@@ -7201,29 +7183,7 @@
                 <a:spcPts val="479"/>
               </a:spcBef>
             </a:pPr>
-            <a:r>
-              <a:rPr b="0" lang="en-CA" sz="2400" spc="-1" strike="noStrike">
-                <a:solidFill>
-                  <a:srgbClr val="000000"/>
-                </a:solidFill>
-                <a:latin typeface="Calibri"/>
-                <a:ea typeface="DejaVu Sans"/>
-              </a:rPr>
-              <a:t>	</a:t>
-            </a:r>
-            <a:r>
-              <a:rPr b="0" lang="en-CA" sz="1500" spc="-1" strike="noStrike" u="sng">
-                <a:solidFill>
-                  <a:srgbClr val="0000ff"/>
-                </a:solidFill>
-                <a:uFillTx/>
-                <a:latin typeface="Calibri"/>
-                <a:ea typeface="DejaVu Sans"/>
-                <a:hlinkClick r:id="rId1"/>
-              </a:rPr>
-              <a:t>https://www.windowscentral.com/how-run-linux-distros-windows-10-using-hyper-v</a:t>
-            </a:r>
-            <a:endParaRPr b="0" lang="en-CA" sz="1500" spc="-1" strike="noStrike">
+            <a:endParaRPr b="0" lang="en-CA" sz="2400" spc="-1" strike="noStrike">
               <a:latin typeface="Arial"/>
             </a:endParaRPr>
           </a:p>
@@ -7244,7 +7204,27 @@
                 <a:latin typeface="Calibri"/>
                 <a:ea typeface="DejaVu Sans"/>
               </a:rPr>
+              <a:t>1)</a:t>
+            </a:r>
+            <a:r>
+              <a:rPr b="0" lang="en-CA" sz="2400" spc="-1" strike="noStrike">
+                <a:solidFill>
+                  <a:srgbClr val="000000"/>
+                </a:solidFill>
+                <a:latin typeface="Calibri"/>
+                <a:ea typeface="DejaVu Sans"/>
+              </a:rPr>
               <a:t>	</a:t>
+            </a:r>
+            <a:r>
+              <a:rPr b="0" lang="en-CA" sz="2400" spc="-1" strike="noStrike">
+                <a:solidFill>
+                  <a:srgbClr val="000000"/>
+                </a:solidFill>
+                <a:latin typeface="Calibri"/>
+                <a:ea typeface="DejaVu Sans"/>
+              </a:rPr>
+              <a:t>To Install Linux 19.04 inside of Hyper-V:</a:t>
             </a:r>
             <a:endParaRPr b="0" lang="en-CA" sz="2400" spc="-1" strike="noStrike">
               <a:latin typeface="Arial"/>
@@ -7259,6 +7239,64 @@
                 <a:spcPts val="479"/>
               </a:spcBef>
             </a:pPr>
+            <a:r>
+              <a:rPr b="0" lang="en-CA" sz="2400" spc="-1" strike="noStrike">
+                <a:solidFill>
+                  <a:srgbClr val="000000"/>
+                </a:solidFill>
+                <a:latin typeface="Calibri"/>
+                <a:ea typeface="DejaVu Sans"/>
+              </a:rPr>
+              <a:t>	</a:t>
+            </a:r>
+            <a:r>
+              <a:rPr b="0" lang="en-CA" sz="1300" spc="-1" strike="noStrike" u="sng">
+                <a:solidFill>
+                  <a:srgbClr val="0000ff"/>
+                </a:solidFill>
+                <a:uFillTx/>
+                <a:latin typeface="Calibri"/>
+                <a:ea typeface="DejaVu Sans"/>
+                <a:hlinkClick r:id="rId1"/>
+              </a:rPr>
+              <a:t>https://www.bleepingcomputer.com/news/microsoft/ubuntu-1904-now-available-in-the-hyper-v-quick-create-gallery/</a:t>
+            </a:r>
+            <a:endParaRPr b="0" lang="en-CA" sz="1300" spc="-1" strike="noStrike">
+              <a:latin typeface="Arial"/>
+            </a:endParaRPr>
+          </a:p>
+          <a:p>
+            <a:pPr>
+              <a:lnSpc>
+                <a:spcPct val="100000"/>
+              </a:lnSpc>
+              <a:spcBef>
+                <a:spcPts val="479"/>
+              </a:spcBef>
+            </a:pPr>
+            <a:r>
+              <a:rPr b="0" lang="en-CA" sz="2400" spc="-1" strike="noStrike">
+                <a:solidFill>
+                  <a:srgbClr val="000000"/>
+                </a:solidFill>
+                <a:latin typeface="Calibri"/>
+                <a:ea typeface="DejaVu Sans"/>
+              </a:rPr>
+              <a:t>	</a:t>
+            </a:r>
+            <a:endParaRPr b="0" lang="en-CA" sz="2400" spc="-1" strike="noStrike">
+              <a:latin typeface="Arial"/>
+            </a:endParaRPr>
+          </a:p>
+          <a:p>
+            <a:pPr>
+              <a:lnSpc>
+                <a:spcPct val="100000"/>
+              </a:lnSpc>
+              <a:spcBef>
+                <a:spcPts val="479"/>
+              </a:spcBef>
+            </a:pPr>
             <a:endParaRPr b="0" lang="en-CA" sz="2400" spc="-1" strike="noStrike">
               <a:latin typeface="Arial"/>
             </a:endParaRPr>
@@ -7274,7 +7312,7 @@
         <p:spPr>
           <a:xfrm>
             <a:off x="432000" y="0"/>
-            <a:ext cx="7448040" cy="1180080"/>
+            <a:ext cx="7446960" cy="1179000"/>
           </a:xfrm>
           <a:prstGeom prst="rect">
             <a:avLst/>
@@ -7345,7 +7383,7 @@
         <p:spPr>
           <a:xfrm>
             <a:off x="0" y="0"/>
-            <a:ext cx="247320" cy="1192320"/>
+            <a:ext cx="246240" cy="1191240"/>
           </a:xfrm>
           <a:prstGeom prst="rect">
             <a:avLst/>
@@ -7471,7 +7509,7 @@
         <p:spPr>
           <a:xfrm>
             <a:off x="504000" y="1449360"/>
-            <a:ext cx="8275680" cy="5215680"/>
+            <a:ext cx="8274600" cy="5214600"/>
           </a:xfrm>
           <a:prstGeom prst="rect">
             <a:avLst/>
@@ -7622,7 +7660,7 @@
         <p:spPr>
           <a:xfrm>
             <a:off x="432000" y="0"/>
-            <a:ext cx="7448040" cy="1180080"/>
+            <a:ext cx="7446960" cy="1179000"/>
           </a:xfrm>
           <a:prstGeom prst="rect">
             <a:avLst/>
@@ -7693,7 +7731,7 @@
         <p:spPr>
           <a:xfrm>
             <a:off x="0" y="0"/>
-            <a:ext cx="247320" cy="1192320"/>
+            <a:ext cx="246240" cy="1191240"/>
           </a:xfrm>
           <a:prstGeom prst="rect">
             <a:avLst/>
@@ -7819,7 +7857,7 @@
         <p:spPr>
           <a:xfrm>
             <a:off x="504000" y="1449360"/>
-            <a:ext cx="8275680" cy="5215680"/>
+            <a:ext cx="8274600" cy="5214600"/>
           </a:xfrm>
           <a:prstGeom prst="rect">
             <a:avLst/>
@@ -7895,10 +7933,11 @@
               </a:spcBef>
             </a:pPr>
             <a:r>
-              <a:rPr b="0" lang="en-CA" sz="2200" spc="-1" strike="noStrike">
-                <a:solidFill>
-                  <a:srgbClr val="000000"/>
-                </a:solidFill>
+              <a:rPr b="0" lang="en-CA" sz="2200" spc="-1" strike="noStrike" u="sng">
+                <a:solidFill>
+                  <a:srgbClr val="0000ff"/>
+                </a:solidFill>
+                <a:uFillTx/>
                 <a:latin typeface="Calibri"/>
                 <a:ea typeface="DejaVu Sans"/>
                 <a:hlinkClick r:id="rId1"/>
@@ -7955,10 +7994,11 @@
               </a:spcBef>
             </a:pPr>
             <a:r>
-              <a:rPr b="0" lang="en-CA" sz="2200" spc="-1" strike="noStrike">
-                <a:solidFill>
-                  <a:srgbClr val="000000"/>
-                </a:solidFill>
+              <a:rPr b="0" lang="en-CA" sz="2200" spc="-1" strike="noStrike" u="sng">
+                <a:solidFill>
+                  <a:srgbClr val="0000ff"/>
+                </a:solidFill>
+                <a:uFillTx/>
                 <a:latin typeface="Calibri"/>
                 <a:ea typeface="DejaVu Sans"/>
                 <a:hlinkClick r:id="rId2"/>
@@ -8003,7 +8043,7 @@
         <p:spPr>
           <a:xfrm>
             <a:off x="432000" y="0"/>
-            <a:ext cx="7448040" cy="1180080"/>
+            <a:ext cx="7446960" cy="1179000"/>
           </a:xfrm>
           <a:prstGeom prst="rect">
             <a:avLst/>
@@ -8074,7 +8114,7 @@
         <p:spPr>
           <a:xfrm>
             <a:off x="0" y="0"/>
-            <a:ext cx="247320" cy="1192320"/>
+            <a:ext cx="246240" cy="1191240"/>
           </a:xfrm>
           <a:prstGeom prst="rect">
             <a:avLst/>
@@ -8200,7 +8240,7 @@
         <p:spPr>
           <a:xfrm>
             <a:off x="504000" y="1377360"/>
-            <a:ext cx="8275680" cy="5215680"/>
+            <a:ext cx="8274600" cy="5214600"/>
           </a:xfrm>
           <a:prstGeom prst="rect">
             <a:avLst/>
@@ -8338,7 +8378,7 @@
               </a:spcBef>
             </a:pPr>
             <a:r>
-              <a:rPr b="0" lang="en-CA" sz="3600" spc="-1" strike="noStrike" u="sng">
+              <a:rPr b="0" lang="en-CA" sz="2800" spc="-1" strike="noStrike" u="sng">
                 <a:solidFill>
                   <a:srgbClr val="0000ff"/>
                 </a:solidFill>
@@ -8349,7 +8389,7 @@
               </a:rPr>
               <a:t>https://tubemint.com/how-to-install-python-3-7-pip-3-ubuntu-19-04/</a:t>
             </a:r>
-            <a:endParaRPr b="0" lang="en-CA" sz="3600" spc="-1" strike="noStrike">
+            <a:endParaRPr b="0" lang="en-CA" sz="2800" spc="-1" strike="noStrike">
               <a:latin typeface="Arial"/>
             </a:endParaRPr>
           </a:p>
@@ -8362,7 +8402,7 @@
                 <a:spcPts val="479"/>
               </a:spcBef>
             </a:pPr>
-            <a:endParaRPr b="0" lang="en-CA" sz="3600" spc="-1" strike="noStrike">
+            <a:endParaRPr b="0" lang="en-CA" sz="2800" spc="-1" strike="noStrike">
               <a:latin typeface="Arial"/>
             </a:endParaRPr>
           </a:p>
@@ -8375,7 +8415,7 @@
                 <a:spcPts val="479"/>
               </a:spcBef>
             </a:pPr>
-            <a:endParaRPr b="0" lang="en-CA" sz="3600" spc="-1" strike="noStrike">
+            <a:endParaRPr b="0" lang="en-CA" sz="2800" spc="-1" strike="noStrike">
               <a:latin typeface="Arial"/>
             </a:endParaRPr>
           </a:p>
@@ -8413,7 +8453,7 @@
         <p:spPr>
           <a:xfrm>
             <a:off x="432000" y="0"/>
-            <a:ext cx="7448040" cy="1180080"/>
+            <a:ext cx="7446960" cy="1179000"/>
           </a:xfrm>
           <a:prstGeom prst="rect">
             <a:avLst/>
@@ -8484,7 +8524,7 @@
         <p:spPr>
           <a:xfrm>
             <a:off x="0" y="0"/>
-            <a:ext cx="247320" cy="1192320"/>
+            <a:ext cx="246240" cy="1191240"/>
           </a:xfrm>
           <a:prstGeom prst="rect">
             <a:avLst/>
@@ -8610,7 +8650,7 @@
         <p:spPr>
           <a:xfrm>
             <a:off x="1083960" y="1551960"/>
-            <a:ext cx="8275680" cy="5215680"/>
+            <a:ext cx="8274600" cy="5214600"/>
           </a:xfrm>
           <a:prstGeom prst="rect">
             <a:avLst/>
@@ -8722,10 +8762,11 @@
               </a:spcBef>
             </a:pPr>
             <a:r>
-              <a:rPr b="0" lang="en-CA" sz="2400" spc="-1" strike="noStrike">
-                <a:solidFill>
-                  <a:srgbClr val="000000"/>
-                </a:solidFill>
+              <a:rPr b="0" lang="en-CA" sz="2400" spc="-1" strike="noStrike" u="sng">
+                <a:solidFill>
+                  <a:srgbClr val="0000ff"/>
+                </a:solidFill>
+                <a:uFillTx/>
                 <a:latin typeface="Calibri"/>
                 <a:ea typeface="DejaVu Sans"/>
                 <a:hlinkClick r:id="rId1"/>
@@ -8770,7 +8811,7 @@
         <p:spPr>
           <a:xfrm>
             <a:off x="432000" y="0"/>
-            <a:ext cx="7448040" cy="1180080"/>
+            <a:ext cx="7446960" cy="1179000"/>
           </a:xfrm>
           <a:prstGeom prst="rect">
             <a:avLst/>
@@ -8841,7 +8882,7 @@
         <p:spPr>
           <a:xfrm>
             <a:off x="0" y="0"/>
-            <a:ext cx="247320" cy="1192320"/>
+            <a:ext cx="246240" cy="1191240"/>
           </a:xfrm>
           <a:prstGeom prst="rect">
             <a:avLst/>
@@ -8967,7 +9008,7 @@
         <p:spPr>
           <a:xfrm>
             <a:off x="1083960" y="1551960"/>
-            <a:ext cx="8275680" cy="5215680"/>
+            <a:ext cx="8274600" cy="5214600"/>
           </a:xfrm>
           <a:prstGeom prst="rect">
             <a:avLst/>
@@ -9132,19 +9173,9 @@
                 <a:latin typeface="Arial"/>
                 <a:ea typeface="DejaVu Sans"/>
               </a:rPr>
-              <a:t>(use this command: </a:t>
-            </a:r>
-            <a:r>
-              <a:rPr b="0" lang="en-CA" sz="900" spc="-1" strike="noStrike">
-                <a:solidFill>
-                  <a:srgbClr val="000000"/>
-                </a:solidFill>
-                <a:latin typeface="Arial"/>
-                <a:ea typeface="DejaVu Sans"/>
-              </a:rPr>
-              <a:t>sudo add-apt-repository "deb [arch=amd64] https://download.docker.com/linux/ubuntu $(lsb_release -cs) stable edge”</a:t>
-            </a:r>
-            <a:endParaRPr b="0" lang="en-CA" sz="900" spc="-1" strike="noStrike">
+              <a:t>(use this command:</a:t>
+            </a:r>
+            <a:endParaRPr b="0" lang="en-CA" sz="2000" spc="-1" strike="noStrike">
               <a:latin typeface="Arial"/>
             </a:endParaRPr>
           </a:p>
@@ -9158,108 +9189,17 @@
               </a:spcBef>
             </a:pPr>
             <a:r>
-              <a:rPr b="0" lang="en-CA" sz="2600" spc="-1" strike="noStrike">
+              <a:rPr b="0" lang="en-CA" sz="2000" spc="-1" strike="noStrike">
                 <a:solidFill>
                   <a:srgbClr val="000000"/>
                 </a:solidFill>
                 <a:latin typeface="Arial"/>
                 <a:ea typeface="DejaVu Sans"/>
-              </a:rPr>
-              <a:t>	</a:t>
-            </a:r>
-            <a:r>
-              <a:rPr b="0" lang="en-CA" sz="2600" spc="-1" strike="noStrike">
-                <a:solidFill>
-                  <a:srgbClr val="000000"/>
-                </a:solidFill>
-                <a:latin typeface="Arial"/>
-                <a:ea typeface="DejaVu Sans"/>
-              </a:rPr>
-              <a:t>	</a:t>
-            </a:r>
-            <a:r>
-              <a:rPr b="0" lang="en-CA" sz="2600" spc="-1" strike="noStrike">
-                <a:solidFill>
-                  <a:srgbClr val="000000"/>
-                </a:solidFill>
-                <a:latin typeface="Arial"/>
-                <a:ea typeface="DejaVu Sans"/>
-              </a:rPr>
-              <a:t>	</a:t>
-            </a:r>
-            <a:r>
-              <a:rPr b="0" lang="en-CA" sz="2600" spc="-1" strike="noStrike">
-                <a:solidFill>
-                  <a:srgbClr val="000000"/>
-                </a:solidFill>
-                <a:latin typeface="Arial"/>
-                <a:ea typeface="DejaVu Sans"/>
-              </a:rPr>
-              <a:t>                </a:t>
-            </a:r>
-            <a:r>
-              <a:rPr b="0" lang="en-CA" sz="2600" spc="-1" strike="noStrike">
-                <a:solidFill>
-                  <a:srgbClr val="000000"/>
-                </a:solidFill>
-                <a:latin typeface="Arial"/>
-                <a:ea typeface="DejaVu Sans"/>
-              </a:rPr>
-              <a:t>	</a:t>
-            </a:r>
-            <a:r>
-              <a:rPr b="0" lang="en-CA" sz="2600" spc="-1" strike="noStrike">
-                <a:solidFill>
-                  <a:srgbClr val="000000"/>
-                </a:solidFill>
-                <a:latin typeface="Arial"/>
-                <a:ea typeface="DejaVu Sans"/>
-              </a:rPr>
-              <a:t>	</a:t>
-            </a:r>
-            <a:r>
-              <a:rPr b="0" lang="en-CA" sz="2600" spc="-1" strike="noStrike">
-                <a:solidFill>
-                  <a:srgbClr val="000000"/>
-                </a:solidFill>
-                <a:latin typeface="Arial"/>
-                <a:ea typeface="DejaVu Sans"/>
-              </a:rPr>
-              <a:t>	</a:t>
-            </a:r>
-            <a:r>
-              <a:rPr b="0" lang="en-CA" sz="2600" spc="-1" strike="noStrike">
-                <a:solidFill>
-                  <a:srgbClr val="000000"/>
-                </a:solidFill>
-                <a:latin typeface="Arial"/>
-                <a:ea typeface="DejaVu Sans"/>
-              </a:rPr>
-              <a:t>	</a:t>
-            </a:r>
-            <a:r>
-              <a:rPr b="0" lang="en-CA" sz="2600" spc="-1" strike="noStrike">
-                <a:solidFill>
-                  <a:srgbClr val="000000"/>
-                </a:solidFill>
-                <a:latin typeface="Arial"/>
-                <a:ea typeface="DejaVu Sans"/>
-              </a:rPr>
-              <a:t>	</a:t>
-            </a:r>
-            <a:r>
-              <a:rPr b="0" lang="en-CA" sz="1800" spc="-1" strike="noStrike" u="sng">
-                <a:solidFill>
-                  <a:srgbClr val="0000ff"/>
-                </a:solidFill>
-                <a:uFillTx/>
-                <a:latin typeface="Calibri"/>
-                <a:ea typeface="DejaVu Sans"/>
                 <a:hlinkClick r:id="rId1"/>
               </a:rPr>
-              <a:t>https://medium.com/@Grigorkh/how-to-install-docker-on-ubuntu-19-04-7ccfeda5935</a:t>
-            </a:r>
-            <a:endParaRPr b="0" lang="en-CA" sz="1800" spc="-1" strike="noStrike">
+              <a:t>https://www.youtube.com/watch?v=lw5eKxMe6dU</a:t>
+            </a:r>
+            <a:endParaRPr b="0" lang="en-CA" sz="2000" spc="-1" strike="noStrike">
               <a:latin typeface="Arial"/>
             </a:endParaRPr>
           </a:p>
@@ -9272,7 +9212,7 @@
                 <a:spcPts val="479"/>
               </a:spcBef>
             </a:pPr>
-            <a:endParaRPr b="0" lang="en-CA" sz="1800" spc="-1" strike="noStrike">
+            <a:endParaRPr b="0" lang="en-CA" sz="2000" spc="-1" strike="noStrike">
               <a:latin typeface="Arial"/>
             </a:endParaRPr>
           </a:p>
@@ -9285,7 +9225,7 @@
                 <a:spcPts val="479"/>
               </a:spcBef>
             </a:pPr>
-            <a:endParaRPr b="0" lang="en-CA" sz="1800" spc="-1" strike="noStrike">
+            <a:endParaRPr b="0" lang="en-CA" sz="2000" spc="-1" strike="noStrike">
               <a:latin typeface="Arial"/>
             </a:endParaRPr>
           </a:p>
@@ -9298,7 +9238,7 @@
                 <a:spcPts val="479"/>
               </a:spcBef>
             </a:pPr>
-            <a:endParaRPr b="0" lang="en-CA" sz="1800" spc="-1" strike="noStrike">
+            <a:endParaRPr b="0" lang="en-CA" sz="2000" spc="-1" strike="noStrike">
               <a:latin typeface="Arial"/>
             </a:endParaRPr>
           </a:p>
@@ -9336,7 +9276,7 @@
         <p:spPr>
           <a:xfrm>
             <a:off x="432000" y="0"/>
-            <a:ext cx="7448040" cy="1180080"/>
+            <a:ext cx="7446960" cy="1179000"/>
           </a:xfrm>
           <a:prstGeom prst="rect">
             <a:avLst/>
@@ -9407,7 +9347,7 @@
         <p:spPr>
           <a:xfrm>
             <a:off x="0" y="0"/>
-            <a:ext cx="247320" cy="1192320"/>
+            <a:ext cx="246240" cy="1191240"/>
           </a:xfrm>
           <a:prstGeom prst="rect">
             <a:avLst/>
@@ -9533,7 +9473,7 @@
         <p:spPr>
           <a:xfrm>
             <a:off x="504000" y="1989360"/>
-            <a:ext cx="8275680" cy="5215680"/>
+            <a:ext cx="8274600" cy="5214600"/>
           </a:xfrm>
           <a:prstGeom prst="rect">
             <a:avLst/>
@@ -9572,7 +9512,7 @@
               </a:rPr>
               <a:t>Installing GIT Resources</a:t>
             </a:r>
-            <a:endParaRPr b="1" lang="en-CA" sz="2800" spc="-1" strike="noStrike">
+            <a:endParaRPr b="0" lang="en-CA" sz="2800" spc="-1" strike="noStrike">
               <a:latin typeface="Arial"/>
             </a:endParaRPr>
           </a:p>
@@ -9595,7 +9535,7 @@
               </a:rPr>
               <a:t>What is git:</a:t>
             </a:r>
-            <a:endParaRPr b="1" lang="en-CA" sz="2800" spc="-1" strike="noStrike">
+            <a:endParaRPr b="0" lang="en-CA" sz="2800" spc="-1" strike="noStrike">
               <a:latin typeface="Arial"/>
             </a:endParaRPr>
           </a:p>
@@ -9609,17 +9549,18 @@
               </a:spcBef>
             </a:pPr>
             <a:r>
-              <a:rPr b="1" lang="en-CA" sz="2800" spc="-1" strike="noStrike">
-                <a:solidFill>
-                  <a:srgbClr val="000000"/>
-                </a:solidFill>
+              <a:rPr b="1" lang="en-CA" sz="2800" spc="-1" strike="noStrike" u="sng">
+                <a:solidFill>
+                  <a:srgbClr val="0000ff"/>
+                </a:solidFill>
+                <a:uFillTx/>
                 <a:latin typeface="Calibri"/>
                 <a:ea typeface="DejaVu Sans"/>
                 <a:hlinkClick r:id="rId1"/>
               </a:rPr>
               <a:t>https://www.youtube.com/watch?v=uUuTYDg9XoI</a:t>
             </a:r>
-            <a:endParaRPr b="1" lang="en-CA" sz="2800" spc="-1" strike="noStrike">
+            <a:endParaRPr b="0" lang="en-CA" sz="2800" spc="-1" strike="noStrike">
               <a:latin typeface="Arial"/>
             </a:endParaRPr>
           </a:p>
@@ -9634,7 +9575,7 @@
         <p:spPr>
           <a:xfrm>
             <a:off x="432000" y="0"/>
-            <a:ext cx="7448040" cy="1180080"/>
+            <a:ext cx="7446960" cy="1179000"/>
           </a:xfrm>
           <a:prstGeom prst="rect">
             <a:avLst/>
@@ -9705,7 +9646,7 @@
         <p:spPr>
           <a:xfrm>
             <a:off x="0" y="0"/>
-            <a:ext cx="247320" cy="1192320"/>
+            <a:ext cx="246240" cy="1191240"/>
           </a:xfrm>
           <a:prstGeom prst="rect">
             <a:avLst/>
@@ -9831,7 +9772,7 @@
         <p:spPr>
           <a:xfrm>
             <a:off x="504000" y="1377360"/>
-            <a:ext cx="8275680" cy="5215680"/>
+            <a:ext cx="8274600" cy="5214600"/>
           </a:xfrm>
           <a:prstGeom prst="rect">
             <a:avLst/>
@@ -9891,6 +9832,7 @@
                 <a:uFillTx/>
                 <a:latin typeface="Calibri"/>
                 <a:ea typeface="DejaVu Sans"/>
+                <a:hlinkClick r:id="rId1"/>
               </a:rPr>
               <a:t>https://linuxconcept.com/install-git-on-ubuntu-19-04-operating-system/</a:t>
             </a:r>
@@ -9909,7 +9851,7 @@
         <p:spPr>
           <a:xfrm>
             <a:off x="432000" y="0"/>
-            <a:ext cx="7448040" cy="1180080"/>
+            <a:ext cx="7446960" cy="1179000"/>
           </a:xfrm>
           <a:prstGeom prst="rect">
             <a:avLst/>
@@ -9980,7 +9922,7 @@
         <p:spPr>
           <a:xfrm>
             <a:off x="0" y="0"/>
-            <a:ext cx="247320" cy="1192320"/>
+            <a:ext cx="246240" cy="1191240"/>
           </a:xfrm>
           <a:prstGeom prst="rect">
             <a:avLst/>
@@ -10106,7 +10048,7 @@
         <p:spPr>
           <a:xfrm>
             <a:off x="504000" y="1377360"/>
-            <a:ext cx="8275680" cy="5215680"/>
+            <a:ext cx="8274600" cy="5214600"/>
           </a:xfrm>
           <a:prstGeom prst="rect">
             <a:avLst/>
@@ -10328,7 +10270,7 @@
         <p:spPr>
           <a:xfrm>
             <a:off x="432000" y="0"/>
-            <a:ext cx="7448040" cy="1180080"/>
+            <a:ext cx="7446960" cy="1179000"/>
           </a:xfrm>
           <a:prstGeom prst="rect">
             <a:avLst/>
@@ -10399,7 +10341,7 @@
         <p:spPr>
           <a:xfrm>
             <a:off x="0" y="0"/>
-            <a:ext cx="247320" cy="1192320"/>
+            <a:ext cx="246240" cy="1191240"/>
           </a:xfrm>
           <a:prstGeom prst="rect">
             <a:avLst/>
@@ -10525,7 +10467,7 @@
         <p:spPr>
           <a:xfrm>
             <a:off x="432000" y="13680"/>
-            <a:ext cx="7448040" cy="1180080"/>
+            <a:ext cx="7446960" cy="1179000"/>
           </a:xfrm>
           <a:prstGeom prst="rect">
             <a:avLst/>
@@ -10596,7 +10538,7 @@
         <p:spPr>
           <a:xfrm>
             <a:off x="0" y="0"/>
-            <a:ext cx="247320" cy="1192320"/>
+            <a:ext cx="246240" cy="1191240"/>
           </a:xfrm>
           <a:prstGeom prst="rect">
             <a:avLst/>
@@ -10666,7 +10608,7 @@
         <p:spPr>
           <a:xfrm>
             <a:off x="457200" y="273600"/>
-            <a:ext cx="8226360" cy="5304960"/>
+            <a:ext cx="8225280" cy="5303880"/>
           </a:xfrm>
           <a:prstGeom prst="rect">
             <a:avLst/>
@@ -10715,7 +10657,7 @@
         <p:spPr>
           <a:xfrm>
             <a:off x="576000" y="1728000"/>
-            <a:ext cx="6765120" cy="2391120"/>
+            <a:ext cx="6764040" cy="2390040"/>
           </a:xfrm>
           <a:prstGeom prst="rect">
             <a:avLst/>
@@ -10764,7 +10706,7 @@
             </a:endParaRPr>
           </a:p>
           <a:p>
-            <a:pPr marL="216000" indent="-213120">
+            <a:pPr marL="216000" indent="-212040">
               <a:lnSpc>
                 <a:spcPct val="100000"/>
               </a:lnSpc>
@@ -10800,7 +10742,7 @@
             </a:endParaRPr>
           </a:p>
           <a:p>
-            <a:pPr marL="216000" indent="-213120">
+            <a:pPr marL="216000" indent="-212040">
               <a:lnSpc>
                 <a:spcPct val="100000"/>
               </a:lnSpc>
@@ -10826,7 +10768,7 @@
             </a:endParaRPr>
           </a:p>
           <a:p>
-            <a:pPr lvl="2" marL="648000" indent="-213480">
+            <a:pPr lvl="2" marL="648000" indent="-212400">
               <a:lnSpc>
                 <a:spcPct val="100000"/>
               </a:lnSpc>
@@ -10852,7 +10794,7 @@
             </a:endParaRPr>
           </a:p>
           <a:p>
-            <a:pPr lvl="2" marL="648000" indent="-213480">
+            <a:pPr lvl="2" marL="648000" indent="-212400">
               <a:lnSpc>
                 <a:spcPct val="100000"/>
               </a:lnSpc>
@@ -10878,7 +10820,7 @@
             </a:endParaRPr>
           </a:p>
           <a:p>
-            <a:pPr lvl="2" marL="648000" indent="-213480">
+            <a:pPr lvl="2" marL="648000" indent="-212400">
               <a:lnSpc>
                 <a:spcPct val="100000"/>
               </a:lnSpc>
@@ -10904,7 +10846,7 @@
             </a:endParaRPr>
           </a:p>
           <a:p>
-            <a:pPr lvl="2" marL="648000" indent="-213480">
+            <a:pPr lvl="2" marL="648000" indent="-212400">
               <a:lnSpc>
                 <a:spcPct val="100000"/>
               </a:lnSpc>
@@ -10930,7 +10872,7 @@
             </a:endParaRPr>
           </a:p>
           <a:p>
-            <a:pPr lvl="2" marL="648000" indent="-213480">
+            <a:pPr lvl="2" marL="648000" indent="-212400">
               <a:lnSpc>
                 <a:spcPct val="100000"/>
               </a:lnSpc>
@@ -10956,7 +10898,7 @@
             </a:endParaRPr>
           </a:p>
           <a:p>
-            <a:pPr lvl="2" marL="648000" indent="-213480">
+            <a:pPr lvl="2" marL="648000" indent="-212400">
               <a:lnSpc>
                 <a:spcPct val="100000"/>
               </a:lnSpc>
@@ -10982,7 +10924,7 @@
             </a:endParaRPr>
           </a:p>
           <a:p>
-            <a:pPr lvl="2" marL="648000" indent="-213480">
+            <a:pPr lvl="2" marL="648000" indent="-212400">
               <a:lnSpc>
                 <a:spcPct val="100000"/>
               </a:lnSpc>
@@ -11008,7 +10950,7 @@
             </a:endParaRPr>
           </a:p>
           <a:p>
-            <a:pPr lvl="2" marL="648000" indent="-213480">
+            <a:pPr lvl="2" marL="648000" indent="-212400">
               <a:lnSpc>
                 <a:spcPct val="100000"/>
               </a:lnSpc>
@@ -11120,7 +11062,7 @@
         <p:spPr>
           <a:xfrm>
             <a:off x="504000" y="1377360"/>
-            <a:ext cx="8275680" cy="5215680"/>
+            <a:ext cx="8274600" cy="5214600"/>
           </a:xfrm>
           <a:prstGeom prst="rect">
             <a:avLst/>
@@ -11159,7 +11101,7 @@
               </a:rPr>
               <a:t>Installing Jenkins Resources</a:t>
             </a:r>
-            <a:endParaRPr b="1" lang="en-CA" sz="2400" spc="-1" strike="noStrike">
+            <a:endParaRPr b="0" lang="en-CA" sz="2400" spc="-1" strike="noStrike">
               <a:latin typeface="Arial"/>
             </a:endParaRPr>
           </a:p>
@@ -11182,7 +11124,7 @@
               </a:rPr>
               <a:t>What is Jenkins</a:t>
             </a:r>
-            <a:endParaRPr b="1" lang="en-CA" sz="2400" spc="-1" strike="noStrike">
+            <a:endParaRPr b="0" lang="en-CA" sz="2400" spc="-1" strike="noStrike">
               <a:latin typeface="Arial"/>
             </a:endParaRPr>
           </a:p>
@@ -11196,17 +11138,18 @@
               </a:spcBef>
             </a:pPr>
             <a:r>
-              <a:rPr b="0" lang="en-CA" sz="2400" spc="-1" strike="noStrike">
-                <a:solidFill>
-                  <a:srgbClr val="000000"/>
-                </a:solidFill>
+              <a:rPr b="0" lang="en-CA" sz="2400" spc="-1" strike="noStrike" u="sng">
+                <a:solidFill>
+                  <a:srgbClr val="0000ff"/>
+                </a:solidFill>
+                <a:uFillTx/>
                 <a:latin typeface="Calibri"/>
                 <a:ea typeface="DejaVu Sans"/>
                 <a:hlinkClick r:id="rId1"/>
               </a:rPr>
               <a:t>https://www.youtube.com/watch?v=LFDrDnKPOTg</a:t>
             </a:r>
-            <a:endParaRPr b="1" lang="en-CA" sz="2400" spc="-1" strike="noStrike">
+            <a:endParaRPr b="0" lang="en-CA" sz="2400" spc="-1" strike="noStrike">
               <a:latin typeface="Arial"/>
             </a:endParaRPr>
           </a:p>
@@ -11219,7 +11162,20 @@
                 <a:spcPts val="479"/>
               </a:spcBef>
             </a:pPr>
-            <a:endParaRPr b="1" lang="en-CA" sz="2400" spc="-1" strike="noStrike">
+            <a:endParaRPr b="0" lang="en-CA" sz="2400" spc="-1" strike="noStrike">
+              <a:latin typeface="Arial"/>
+            </a:endParaRPr>
+          </a:p>
+          <a:p>
+            <a:pPr>
+              <a:lnSpc>
+                <a:spcPct val="100000"/>
+              </a:lnSpc>
+              <a:spcBef>
+                <a:spcPts val="479"/>
+              </a:spcBef>
+            </a:pPr>
+            <a:endParaRPr b="0" lang="en-CA" sz="2400" spc="-1" strike="noStrike">
               <a:latin typeface="Arial"/>
             </a:endParaRPr>
           </a:p>
@@ -11234,7 +11190,7 @@
         <p:spPr>
           <a:xfrm>
             <a:off x="432000" y="0"/>
-            <a:ext cx="7448040" cy="1180080"/>
+            <a:ext cx="7446960" cy="1179000"/>
           </a:xfrm>
           <a:prstGeom prst="rect">
             <a:avLst/>
@@ -11305,7 +11261,7 @@
         <p:spPr>
           <a:xfrm>
             <a:off x="0" y="0"/>
-            <a:ext cx="247320" cy="1192320"/>
+            <a:ext cx="246240" cy="1191240"/>
           </a:xfrm>
           <a:prstGeom prst="rect">
             <a:avLst/>
@@ -11431,7 +11387,7 @@
         <p:spPr>
           <a:xfrm>
             <a:off x="504000" y="1377360"/>
-            <a:ext cx="8275680" cy="5215680"/>
+            <a:ext cx="8274600" cy="5214600"/>
           </a:xfrm>
           <a:prstGeom prst="rect">
             <a:avLst/>
@@ -11470,7 +11426,7 @@
               </a:rPr>
               <a:t>Installing Jenkins</a:t>
             </a:r>
-            <a:endParaRPr b="1" lang="en-CA" sz="2400" spc="-1" strike="noStrike">
+            <a:endParaRPr b="0" lang="en-CA" sz="2400" spc="-1" strike="noStrike">
               <a:latin typeface="Arial"/>
             </a:endParaRPr>
           </a:p>
@@ -11483,7 +11439,7 @@
                 <a:spcPts val="479"/>
               </a:spcBef>
             </a:pPr>
-            <a:endParaRPr b="1" lang="en-CA" sz="2400" spc="-1" strike="noStrike">
+            <a:endParaRPr b="0" lang="en-CA" sz="2400" spc="-1" strike="noStrike">
               <a:latin typeface="Arial"/>
             </a:endParaRPr>
           </a:p>
@@ -11506,7 +11462,7 @@
               </a:rPr>
               <a:t>Follow the steps here to install jenkins:</a:t>
             </a:r>
-            <a:endParaRPr b="1" lang="en-CA" sz="2400" spc="-1" strike="noStrike">
+            <a:endParaRPr b="0" lang="en-CA" sz="2400" spc="-1" strike="noStrike">
               <a:latin typeface="Arial"/>
             </a:endParaRPr>
           </a:p>
@@ -11520,17 +11476,18 @@
               </a:spcBef>
             </a:pPr>
             <a:r>
-              <a:rPr b="1" lang="en-CA" sz="2400" spc="-1" strike="noStrike">
-                <a:solidFill>
-                  <a:srgbClr val="000000"/>
-                </a:solidFill>
+              <a:rPr b="1" lang="en-CA" sz="2400" spc="-1" strike="noStrike" u="sng">
+                <a:solidFill>
+                  <a:srgbClr val="0000ff"/>
+                </a:solidFill>
+                <a:uFillTx/>
                 <a:latin typeface="Calibri"/>
                 <a:ea typeface="DejaVu Sans"/>
                 <a:hlinkClick r:id="rId1"/>
               </a:rPr>
               <a:t>https://www.youtube.com/watch?v=Uz9XDdR3eck</a:t>
             </a:r>
-            <a:endParaRPr b="1" lang="en-CA" sz="2400" spc="-1" strike="noStrike">
+            <a:endParaRPr b="0" lang="en-CA" sz="2400" spc="-1" strike="noStrike">
               <a:latin typeface="Arial"/>
             </a:endParaRPr>
           </a:p>
@@ -11543,7 +11500,7 @@
                 <a:spcPts val="479"/>
               </a:spcBef>
             </a:pPr>
-            <a:endParaRPr b="1" lang="en-CA" sz="2400" spc="-1" strike="noStrike">
+            <a:endParaRPr b="0" lang="en-CA" sz="2400" spc="-1" strike="noStrike">
               <a:latin typeface="Arial"/>
             </a:endParaRPr>
           </a:p>
@@ -11556,7 +11513,7 @@
                 <a:spcPts val="479"/>
               </a:spcBef>
             </a:pPr>
-            <a:endParaRPr b="1" lang="en-CA" sz="2400" spc="-1" strike="noStrike">
+            <a:endParaRPr b="0" lang="en-CA" sz="2400" spc="-1" strike="noStrike">
               <a:latin typeface="Arial"/>
             </a:endParaRPr>
           </a:p>
@@ -11569,7 +11526,7 @@
                 <a:spcPts val="479"/>
               </a:spcBef>
             </a:pPr>
-            <a:endParaRPr b="1" lang="en-CA" sz="2400" spc="-1" strike="noStrike">
+            <a:endParaRPr b="0" lang="en-CA" sz="2400" spc="-1" strike="noStrike">
               <a:latin typeface="Arial"/>
             </a:endParaRPr>
           </a:p>
@@ -11584,7 +11541,7 @@
         <p:spPr>
           <a:xfrm>
             <a:off x="432000" y="0"/>
-            <a:ext cx="7448040" cy="1180080"/>
+            <a:ext cx="7446960" cy="1179000"/>
           </a:xfrm>
           <a:prstGeom prst="rect">
             <a:avLst/>
@@ -11655,7 +11612,7 @@
         <p:spPr>
           <a:xfrm>
             <a:off x="0" y="0"/>
-            <a:ext cx="247320" cy="1192320"/>
+            <a:ext cx="246240" cy="1191240"/>
           </a:xfrm>
           <a:prstGeom prst="rect">
             <a:avLst/>
@@ -11780,8 +11737,8 @@
         </p:nvSpPr>
         <p:spPr>
           <a:xfrm>
-            <a:off x="504000" y="1269360"/>
-            <a:ext cx="8275680" cy="5215680"/>
+            <a:off x="504000" y="1377360"/>
+            <a:ext cx="8274600" cy="5214600"/>
           </a:xfrm>
           <a:prstGeom prst="rect">
             <a:avLst/>
@@ -11806,82 +11763,32 @@
               <a:lnSpc>
                 <a:spcPct val="100000"/>
               </a:lnSpc>
-            </a:pPr>
-            <a:r>
-              <a:rPr b="1" lang="en-CA" sz="1800" spc="-1" strike="noStrike">
-                <a:solidFill>
-                  <a:srgbClr val="000000"/>
-                </a:solidFill>
-                <a:latin typeface="Arial"/>
-                <a:ea typeface="DejaVu Sans"/>
-              </a:rPr>
-              <a:t>Ansible</a:t>
-            </a:r>
-            <a:endParaRPr b="0" lang="en-CA" sz="1800" spc="-1" strike="noStrike">
-              <a:latin typeface="Arial"/>
-            </a:endParaRPr>
-          </a:p>
-          <a:p>
-            <a:pPr>
-              <a:lnSpc>
-                <a:spcPct val="100000"/>
-              </a:lnSpc>
-            </a:pPr>
-            <a:endParaRPr b="0" lang="en-CA" sz="1800" spc="-1" strike="noStrike">
-              <a:latin typeface="Arial"/>
-            </a:endParaRPr>
-          </a:p>
-          <a:p>
-            <a:pPr>
-              <a:lnSpc>
-                <a:spcPct val="100000"/>
-              </a:lnSpc>
-            </a:pPr>
-            <a:r>
-              <a:rPr b="1" lang="en-CA" sz="1800" spc="-1" strike="noStrike">
-                <a:solidFill>
-                  <a:srgbClr val="000000"/>
-                </a:solidFill>
-                <a:latin typeface="Arial"/>
-                <a:ea typeface="DejaVu Sans"/>
-              </a:rPr>
-              <a:t>Resouces:</a:t>
-            </a:r>
-            <a:endParaRPr b="0" lang="en-CA" sz="1800" spc="-1" strike="noStrike">
-              <a:latin typeface="Arial"/>
-            </a:endParaRPr>
-          </a:p>
-          <a:p>
-            <a:pPr>
-              <a:lnSpc>
-                <a:spcPct val="100000"/>
-              </a:lnSpc>
-            </a:pPr>
-            <a:endParaRPr b="0" lang="en-CA" sz="1800" spc="-1" strike="noStrike">
-              <a:latin typeface="Arial"/>
-            </a:endParaRPr>
-          </a:p>
-          <a:p>
-            <a:pPr>
-              <a:lnSpc>
-                <a:spcPct val="100000"/>
-              </a:lnSpc>
-            </a:pPr>
-            <a:r>
-              <a:rPr b="0" lang="en-CA" sz="1800" spc="-1" strike="noStrike">
-                <a:latin typeface="Arial"/>
-              </a:rPr>
-              <a:t>What is ansible</a:t>
-            </a:r>
-            <a:endParaRPr b="0" lang="en-CA" sz="1800" spc="-1" strike="noStrike">
-              <a:latin typeface="Arial"/>
-            </a:endParaRPr>
-          </a:p>
-          <a:p>
-            <a:pPr>
-              <a:lnSpc>
-                <a:spcPct val="100000"/>
-              </a:lnSpc>
+              <a:spcBef>
+                <a:spcPts val="479"/>
+              </a:spcBef>
+            </a:pPr>
+            <a:r>
+              <a:rPr b="1" lang="en-CA" sz="2400" spc="-1" strike="noStrike">
+                <a:solidFill>
+                  <a:srgbClr val="000000"/>
+                </a:solidFill>
+                <a:latin typeface="Calibri"/>
+                <a:ea typeface="DejaVu Sans"/>
+              </a:rPr>
+              <a:t>Unlock Jenkins</a:t>
+            </a:r>
+            <a:endParaRPr b="0" lang="en-CA" sz="2400" spc="-1" strike="noStrike">
+              <a:latin typeface="Arial"/>
+            </a:endParaRPr>
+          </a:p>
+          <a:p>
+            <a:pPr>
+              <a:lnSpc>
+                <a:spcPct val="100000"/>
+              </a:lnSpc>
+              <a:spcBef>
+                <a:spcPts val="479"/>
+              </a:spcBef>
             </a:pPr>
             <a:r>
               <a:rPr b="0" lang="en-CA" sz="2400" spc="-1" strike="noStrike">
@@ -11890,10 +11797,140 @@
                 </a:solidFill>
                 <a:latin typeface="Calibri"/>
                 <a:ea typeface="DejaVu Sans"/>
-                <a:hlinkClick r:id="rId1"/>
-              </a:rPr>
-              <a:t> https://www.youtube.com/watch?v=p7-U1_E_j3wK</a:t>
-            </a:r>
+              </a:rPr>
+              <a:t>1) Browse to localhost:8080</a:t>
+            </a:r>
+            <a:endParaRPr b="0" lang="en-CA" sz="2400" spc="-1" strike="noStrike">
+              <a:latin typeface="Arial"/>
+            </a:endParaRPr>
+          </a:p>
+          <a:p>
+            <a:pPr>
+              <a:lnSpc>
+                <a:spcPct val="100000"/>
+              </a:lnSpc>
+              <a:spcBef>
+                <a:spcPts val="479"/>
+              </a:spcBef>
+            </a:pPr>
+            <a:r>
+              <a:rPr b="0" lang="en-CA" sz="2400" spc="-1" strike="noStrike">
+                <a:solidFill>
+                  <a:srgbClr val="000000"/>
+                </a:solidFill>
+                <a:latin typeface="Calibri"/>
+                <a:ea typeface="DejaVu Sans"/>
+              </a:rPr>
+              <a:t>2) Open a terminal</a:t>
+            </a:r>
+            <a:endParaRPr b="0" lang="en-CA" sz="2400" spc="-1" strike="noStrike">
+              <a:latin typeface="Arial"/>
+            </a:endParaRPr>
+          </a:p>
+          <a:p>
+            <a:pPr>
+              <a:lnSpc>
+                <a:spcPct val="100000"/>
+              </a:lnSpc>
+              <a:spcBef>
+                <a:spcPts val="479"/>
+              </a:spcBef>
+            </a:pPr>
+            <a:r>
+              <a:rPr b="0" lang="en-CA" sz="2400" spc="-1" strike="noStrike">
+                <a:solidFill>
+                  <a:srgbClr val="000000"/>
+                </a:solidFill>
+                <a:latin typeface="Calibri"/>
+                <a:ea typeface="DejaVu Sans"/>
+              </a:rPr>
+              <a:t>3) cat /var/lib/jenkins/secrets/initialAdminPassword</a:t>
+            </a:r>
+            <a:endParaRPr b="0" lang="en-CA" sz="2400" spc="-1" strike="noStrike">
+              <a:latin typeface="Arial"/>
+            </a:endParaRPr>
+          </a:p>
+          <a:p>
+            <a:pPr>
+              <a:lnSpc>
+                <a:spcPct val="100000"/>
+              </a:lnSpc>
+              <a:spcBef>
+                <a:spcPts val="479"/>
+              </a:spcBef>
+            </a:pPr>
+            <a:r>
+              <a:rPr b="0" lang="en-CA" sz="2400" spc="-1" strike="noStrike">
+                <a:solidFill>
+                  <a:srgbClr val="000000"/>
+                </a:solidFill>
+                <a:latin typeface="Calibri"/>
+                <a:ea typeface="DejaVu Sans"/>
+              </a:rPr>
+              <a:t>4) Copy the output of that command into the input box</a:t>
+            </a:r>
+            <a:endParaRPr b="0" lang="en-CA" sz="2400" spc="-1" strike="noStrike">
+              <a:latin typeface="Arial"/>
+            </a:endParaRPr>
+          </a:p>
+          <a:p>
+            <a:pPr>
+              <a:lnSpc>
+                <a:spcPct val="100000"/>
+              </a:lnSpc>
+              <a:spcBef>
+                <a:spcPts val="479"/>
+              </a:spcBef>
+            </a:pPr>
+            <a:r>
+              <a:rPr b="0" lang="en-CA" sz="2400" spc="-1" strike="noStrike">
+                <a:solidFill>
+                  <a:srgbClr val="000000"/>
+                </a:solidFill>
+                <a:latin typeface="Calibri"/>
+                <a:ea typeface="DejaVu Sans"/>
+              </a:rPr>
+              <a:t>5) click continue as an admin</a:t>
+            </a:r>
+            <a:endParaRPr b="0" lang="en-CA" sz="2400" spc="-1" strike="noStrike">
+              <a:latin typeface="Arial"/>
+            </a:endParaRPr>
+          </a:p>
+          <a:p>
+            <a:pPr>
+              <a:lnSpc>
+                <a:spcPct val="100000"/>
+              </a:lnSpc>
+              <a:spcBef>
+                <a:spcPts val="479"/>
+              </a:spcBef>
+            </a:pPr>
+            <a:endParaRPr b="0" lang="en-CA" sz="2400" spc="-1" strike="noStrike">
+              <a:latin typeface="Arial"/>
+            </a:endParaRPr>
+          </a:p>
+          <a:p>
+            <a:pPr>
+              <a:lnSpc>
+                <a:spcPct val="100000"/>
+              </a:lnSpc>
+              <a:spcBef>
+                <a:spcPts val="479"/>
+              </a:spcBef>
+            </a:pPr>
+            <a:endParaRPr b="0" lang="en-CA" sz="2400" spc="-1" strike="noStrike">
+              <a:latin typeface="Arial"/>
+            </a:endParaRPr>
+          </a:p>
+          <a:p>
+            <a:pPr>
+              <a:lnSpc>
+                <a:spcPct val="100000"/>
+              </a:lnSpc>
+              <a:spcBef>
+                <a:spcPts val="479"/>
+              </a:spcBef>
+            </a:pPr>
             <a:endParaRPr b="0" lang="en-CA" sz="2400" spc="-1" strike="noStrike">
               <a:latin typeface="Arial"/>
             </a:endParaRPr>
@@ -11909,7 +11946,7 @@
         <p:spPr>
           <a:xfrm>
             <a:off x="432000" y="0"/>
-            <a:ext cx="7448040" cy="1180080"/>
+            <a:ext cx="7446960" cy="1179000"/>
           </a:xfrm>
           <a:prstGeom prst="rect">
             <a:avLst/>
@@ -11980,7 +12017,7 @@
         <p:spPr>
           <a:xfrm>
             <a:off x="0" y="0"/>
-            <a:ext cx="247320" cy="1192320"/>
+            <a:ext cx="246240" cy="1191240"/>
           </a:xfrm>
           <a:prstGeom prst="rect">
             <a:avLst/>
@@ -12076,6 +12113,13 @@
 <file path=ppt/slides/slide23.xml><?xml version="1.0" encoding="utf-8"?>
 <p:sld xmlns:a="http://schemas.openxmlformats.org/drawingml/2006/main" xmlns:p="http://schemas.openxmlformats.org/presentationml/2006/main" xmlns:r="http://schemas.openxmlformats.org/officeDocument/2006/relationships" xmlns:p14="http://schemas.microsoft.com/office/powerpoint/2010/main" xmlns:p15="http://schemas.microsoft.com/office/powerpoint/2012/main" xmlns:mc="http://schemas.openxmlformats.org/markup-compatibility/2006">
   <p:cSld>
+    <p:bg>
+      <p:bgPr>
+        <a:solidFill>
+          <a:srgbClr val="f2f2f2"/>
+        </a:solidFill>
+      </p:bgPr>
+    </p:bg>
     <p:spTree>
       <p:nvGrpSpPr>
         <p:cNvPr id="1" name=""/>
@@ -12098,8 +12142,8 @@
         </p:nvSpPr>
         <p:spPr>
           <a:xfrm>
-            <a:off x="457200" y="273600"/>
-            <a:ext cx="8227440" cy="1143000"/>
+            <a:off x="504000" y="1269360"/>
+            <a:ext cx="8274600" cy="5214600"/>
           </a:xfrm>
           <a:prstGeom prst="rect">
             <a:avLst/>
@@ -12115,6 +12159,113 @@
           <a:effectRef idx="0"/>
           <a:fontRef idx="minor"/>
         </p:style>
+        <p:txBody>
+          <a:bodyPr lIns="90000" rIns="90000" tIns="45000" bIns="45000" anchor="ctr">
+            <a:normAutofit/>
+          </a:bodyPr>
+          <a:p>
+            <a:pPr>
+              <a:lnSpc>
+                <a:spcPct val="100000"/>
+              </a:lnSpc>
+            </a:pPr>
+            <a:r>
+              <a:rPr b="1" lang="en-CA" sz="1800" spc="-1" strike="noStrike">
+                <a:solidFill>
+                  <a:srgbClr val="000000"/>
+                </a:solidFill>
+                <a:latin typeface="Arial"/>
+                <a:ea typeface="DejaVu Sans"/>
+              </a:rPr>
+              <a:t>Ansible</a:t>
+            </a:r>
+            <a:endParaRPr b="0" lang="en-CA" sz="1800" spc="-1" strike="noStrike">
+              <a:latin typeface="Arial"/>
+            </a:endParaRPr>
+          </a:p>
+          <a:p>
+            <a:pPr>
+              <a:lnSpc>
+                <a:spcPct val="100000"/>
+              </a:lnSpc>
+            </a:pPr>
+            <a:endParaRPr b="0" lang="en-CA" sz="1800" spc="-1" strike="noStrike">
+              <a:latin typeface="Arial"/>
+            </a:endParaRPr>
+          </a:p>
+          <a:p>
+            <a:pPr>
+              <a:lnSpc>
+                <a:spcPct val="100000"/>
+              </a:lnSpc>
+            </a:pPr>
+            <a:r>
+              <a:rPr b="1" lang="en-CA" sz="1800" spc="-1" strike="noStrike">
+                <a:solidFill>
+                  <a:srgbClr val="000000"/>
+                </a:solidFill>
+                <a:latin typeface="Arial"/>
+                <a:ea typeface="DejaVu Sans"/>
+              </a:rPr>
+              <a:t>Resouces:</a:t>
+            </a:r>
+            <a:endParaRPr b="0" lang="en-CA" sz="1800" spc="-1" strike="noStrike">
+              <a:latin typeface="Arial"/>
+            </a:endParaRPr>
+          </a:p>
+          <a:p>
+            <a:pPr>
+              <a:lnSpc>
+                <a:spcPct val="100000"/>
+              </a:lnSpc>
+            </a:pPr>
+            <a:endParaRPr b="0" lang="en-CA" sz="1800" spc="-1" strike="noStrike">
+              <a:latin typeface="Arial"/>
+            </a:endParaRPr>
+          </a:p>
+          <a:p>
+            <a:pPr>
+              <a:lnSpc>
+                <a:spcPct val="100000"/>
+              </a:lnSpc>
+            </a:pPr>
+            <a:r>
+              <a:rPr b="0" lang="en-CA" sz="1800" spc="-1" strike="noStrike">
+                <a:solidFill>
+                  <a:srgbClr val="000000"/>
+                </a:solidFill>
+                <a:latin typeface="Arial"/>
+                <a:ea typeface="DejaVu Sans"/>
+              </a:rPr>
+              <a:t>What is ansible</a:t>
+            </a:r>
+            <a:endParaRPr b="0" lang="en-CA" sz="1800" spc="-1" strike="noStrike">
+              <a:latin typeface="Arial"/>
+            </a:endParaRPr>
+          </a:p>
+          <a:p>
+            <a:pPr>
+              <a:lnSpc>
+                <a:spcPct val="100000"/>
+              </a:lnSpc>
+            </a:pPr>
+            <a:r>
+              <a:rPr b="0" lang="en-CA" sz="2400" spc="-1" strike="noStrike" u="sng">
+                <a:solidFill>
+                  <a:srgbClr val="0000ff"/>
+                </a:solidFill>
+                <a:uFillTx/>
+                <a:latin typeface="Calibri"/>
+                <a:ea typeface="DejaVu Sans"/>
+                <a:hlinkClick r:id="rId1"/>
+              </a:rPr>
+              <a:t> https://www.youtube.com/watch?v=p7-U1_E_j3wK</a:t>
+            </a:r>
+            <a:endParaRPr b="0" lang="en-CA" sz="2400" spc="-1" strike="noStrike">
+              <a:latin typeface="Arial"/>
+            </a:endParaRPr>
+          </a:p>
+        </p:txBody>
       </p:sp>
       <p:sp>
         <p:nvSpPr>
@@ -12124,8 +12275,8 @@
         </p:nvSpPr>
         <p:spPr>
           <a:xfrm>
-            <a:off x="457200" y="1604520"/>
-            <a:ext cx="2647800" cy="1895040"/>
+            <a:off x="432000" y="0"/>
+            <a:ext cx="7446960" cy="1179000"/>
           </a:xfrm>
           <a:prstGeom prst="rect">
             <a:avLst/>
@@ -12141,6 +12292,51 @@
           <a:effectRef idx="0"/>
           <a:fontRef idx="minor"/>
         </p:style>
+        <p:txBody>
+          <a:bodyPr lIns="90000" rIns="90000" tIns="45000" bIns="45000" anchor="ctr">
+            <a:normAutofit/>
+          </a:bodyPr>
+          <a:p>
+            <a:pPr>
+              <a:lnSpc>
+                <a:spcPct val="100000"/>
+              </a:lnSpc>
+            </a:pPr>
+            <a:r>
+              <a:rPr b="0" lang="en-CA" sz="3000" spc="-1" strike="noStrike" cap="all">
+                <a:solidFill>
+                  <a:srgbClr val="292929"/>
+                </a:solidFill>
+                <a:latin typeface="Nexa Bold"/>
+                <a:ea typeface="DejaVu Sans"/>
+              </a:rPr>
+              <a:t>Installing our</a:t>
+            </a:r>
+            <a:r>
+              <a:rPr b="0" lang="en-CA" sz="3000" spc="-1" strike="noStrike">
+                <a:solidFill>
+                  <a:srgbClr val="292929"/>
+                </a:solidFill>
+                <a:latin typeface="Nexa Bold"/>
+                <a:ea typeface="DejaVu Sans"/>
+              </a:rPr>
+              <a:t> </a:t>
+            </a:r>
+            <a:r>
+              <a:rPr b="0" lang="en-CA" sz="3000" spc="-1" strike="noStrike" cap="all">
+                <a:solidFill>
+                  <a:srgbClr val="1fa0be"/>
+                </a:solidFill>
+                <a:latin typeface="Nexa Bold"/>
+                <a:ea typeface="DejaVu Sans"/>
+              </a:rPr>
+              <a:t>Stack</a:t>
+            </a:r>
+            <a:endParaRPr b="0" lang="en-CA" sz="3000" spc="-1" strike="noStrike">
+              <a:latin typeface="Arial"/>
+            </a:endParaRPr>
+          </a:p>
+        </p:txBody>
       </p:sp>
       <p:sp>
         <p:nvSpPr>
@@ -12150,431 +12346,67 @@
         </p:nvSpPr>
         <p:spPr>
           <a:xfrm>
-            <a:off x="3239640" y="1604520"/>
-            <a:ext cx="2647800" cy="1895040"/>
-          </a:xfrm>
-          <a:prstGeom prst="rect">
-            <a:avLst/>
-          </a:prstGeom>
-          <a:noFill/>
+            <a:off x="0" y="0"/>
+            <a:ext cx="246240" cy="1191240"/>
+          </a:xfrm>
+          <a:prstGeom prst="rect">
+            <a:avLst/>
+          </a:prstGeom>
+          <a:solidFill>
+            <a:srgbClr val="146e83"/>
+          </a:solidFill>
           <a:ln>
-            <a:noFill/>
+            <a:round/>
           </a:ln>
         </p:spPr>
         <p:style>
-          <a:lnRef idx="0"/>
-          <a:fillRef idx="0"/>
-          <a:effectRef idx="0"/>
+          <a:lnRef idx="2">
+            <a:schemeClr val="accent1">
+              <a:shade val="50000"/>
+            </a:schemeClr>
+          </a:lnRef>
+          <a:fillRef idx="1">
+            <a:schemeClr val="accent1"/>
+          </a:fillRef>
+          <a:effectRef idx="0">
+            <a:schemeClr val="accent1"/>
+          </a:effectRef>
           <a:fontRef idx="minor"/>
         </p:style>
       </p:sp>
       <p:sp>
         <p:nvSpPr>
-          <p:cNvPr id="246" name="CustomShape 4"/>
+          <p:cNvPr id="246" name="Line 4"/>
           <p:cNvSpPr/>
           <p:nvPr/>
         </p:nvSpPr>
         <p:spPr>
           <a:xfrm>
-            <a:off x="6022080" y="1604520"/>
-            <a:ext cx="2647800" cy="1895040"/>
-          </a:xfrm>
-          <a:prstGeom prst="rect">
-            <a:avLst/>
-          </a:prstGeom>
-          <a:noFill/>
-          <a:ln>
-            <a:noFill/>
+            <a:off x="251280" y="1196640"/>
+            <a:ext cx="8892720" cy="360"/>
+          </a:xfrm>
+          <a:prstGeom prst="line">
+            <a:avLst/>
+          </a:prstGeom>
+          <a:ln w="22320">
+            <a:solidFill>
+              <a:srgbClr val="146e83"/>
+            </a:solidFill>
+            <a:round/>
           </a:ln>
         </p:spPr>
         <p:style>
-          <a:lnRef idx="0"/>
-          <a:fillRef idx="0"/>
-          <a:effectRef idx="0"/>
+          <a:lnRef idx="1">
+            <a:schemeClr val="accent1"/>
+          </a:lnRef>
+          <a:fillRef idx="0">
+            <a:schemeClr val="accent1"/>
+          </a:fillRef>
+          <a:effectRef idx="0">
+            <a:schemeClr val="accent1"/>
+          </a:effectRef>
           <a:fontRef idx="minor"/>
         </p:style>
-      </p:sp>
-      <p:sp>
-        <p:nvSpPr>
-          <p:cNvPr id="247" name="CustomShape 5"/>
-          <p:cNvSpPr/>
-          <p:nvPr/>
-        </p:nvSpPr>
-        <p:spPr>
-          <a:xfrm>
-            <a:off x="457200" y="3682080"/>
-            <a:ext cx="2647800" cy="1895040"/>
-          </a:xfrm>
-          <a:prstGeom prst="rect">
-            <a:avLst/>
-          </a:prstGeom>
-          <a:noFill/>
-          <a:ln>
-            <a:noFill/>
-          </a:ln>
-        </p:spPr>
-        <p:style>
-          <a:lnRef idx="0"/>
-          <a:fillRef idx="0"/>
-          <a:effectRef idx="0"/>
-          <a:fontRef idx="minor"/>
-        </p:style>
-      </p:sp>
-      <p:sp>
-        <p:nvSpPr>
-          <p:cNvPr id="248" name="CustomShape 6"/>
-          <p:cNvSpPr/>
-          <p:nvPr/>
-        </p:nvSpPr>
-        <p:spPr>
-          <a:xfrm>
-            <a:off x="3239640" y="3682080"/>
-            <a:ext cx="2647800" cy="1895040"/>
-          </a:xfrm>
-          <a:prstGeom prst="rect">
-            <a:avLst/>
-          </a:prstGeom>
-          <a:noFill/>
-          <a:ln>
-            <a:noFill/>
-          </a:ln>
-        </p:spPr>
-        <p:style>
-          <a:lnRef idx="0"/>
-          <a:fillRef idx="0"/>
-          <a:effectRef idx="0"/>
-          <a:fontRef idx="minor"/>
-        </p:style>
-      </p:sp>
-      <p:sp>
-        <p:nvSpPr>
-          <p:cNvPr id="249" name="CustomShape 7"/>
-          <p:cNvSpPr/>
-          <p:nvPr/>
-        </p:nvSpPr>
-        <p:spPr>
-          <a:xfrm>
-            <a:off x="6022080" y="3682080"/>
-            <a:ext cx="2647800" cy="1895040"/>
-          </a:xfrm>
-          <a:prstGeom prst="rect">
-            <a:avLst/>
-          </a:prstGeom>
-          <a:noFill/>
-          <a:ln>
-            <a:noFill/>
-          </a:ln>
-        </p:spPr>
-        <p:style>
-          <a:lnRef idx="0"/>
-          <a:fillRef idx="0"/>
-          <a:effectRef idx="0"/>
-          <a:fontRef idx="minor"/>
-        </p:style>
-      </p:sp>
-      <p:sp>
-        <p:nvSpPr>
-          <p:cNvPr id="250" name="TextShape 8"/>
-          <p:cNvSpPr txBox="1"/>
-          <p:nvPr/>
-        </p:nvSpPr>
-        <p:spPr>
-          <a:xfrm>
-            <a:off x="666720" y="1148760"/>
-            <a:ext cx="7866360" cy="4590000"/>
-          </a:xfrm>
-          <a:prstGeom prst="rect">
-            <a:avLst/>
-          </a:prstGeom>
-          <a:noFill/>
-          <a:ln>
-            <a:noFill/>
-          </a:ln>
-        </p:spPr>
-        <p:txBody>
-          <a:bodyPr lIns="90000" rIns="90000" tIns="45000" bIns="45000"/>
-          <a:p>
-            <a:r>
-              <a:rPr b="1" lang="en-CA" sz="1800" spc="-1" strike="noStrike">
-                <a:solidFill>
-                  <a:srgbClr val="000000"/>
-                </a:solidFill>
-                <a:latin typeface="Arial"/>
-                <a:ea typeface="DejaVu Sans"/>
-              </a:rPr>
-              <a:t>Setting up our AWS Account (we’re using the free tier)</a:t>
-            </a:r>
-            <a:endParaRPr b="0" lang="en-CA" sz="1800" spc="-1" strike="noStrike">
-              <a:latin typeface="Arial"/>
-            </a:endParaRPr>
-          </a:p>
-          <a:p>
-            <a:endParaRPr b="0" lang="en-CA" sz="1800" spc="-1" strike="noStrike">
-              <a:latin typeface="Arial"/>
-            </a:endParaRPr>
-          </a:p>
-          <a:p>
-            <a:r>
-              <a:rPr b="0" lang="en-CA" sz="1800" spc="-1" strike="noStrike">
-                <a:solidFill>
-                  <a:srgbClr val="000000"/>
-                </a:solidFill>
-                <a:latin typeface="Arial"/>
-                <a:ea typeface="DejaVu Sans"/>
-              </a:rPr>
-              <a:t>1) Browse to : </a:t>
-            </a:r>
-            <a:endParaRPr b="0" lang="en-CA" sz="1800" spc="-1" strike="noStrike">
-              <a:latin typeface="Arial"/>
-            </a:endParaRPr>
-          </a:p>
-          <a:p>
-            <a:r>
-              <a:rPr b="0" lang="en-CA" sz="1050" spc="-1" strike="noStrike">
-                <a:solidFill>
-                  <a:srgbClr val="000000"/>
-                </a:solidFill>
-                <a:latin typeface="Arial"/>
-                <a:ea typeface="DejaVu Sans"/>
-              </a:rPr>
-              <a:t>                                     </a:t>
-            </a:r>
-            <a:r>
-              <a:rPr b="0" lang="en-CA" sz="1050" spc="-1" strike="noStrike">
-                <a:solidFill>
-                  <a:srgbClr val="000000"/>
-                </a:solidFill>
-                <a:latin typeface="Arial"/>
-                <a:ea typeface="DejaVu Sans"/>
-                <a:hlinkClick r:id="rId1"/>
-              </a:rPr>
-              <a:t>https://aws.amazon.com/free/?all-free-tier.sort-by=item.additionalFields.SortRank&amp;all-free-tier.sort-order=asc</a:t>
-            </a:r>
-            <a:endParaRPr b="0" lang="en-CA" sz="1050" spc="-1" strike="noStrike">
-              <a:latin typeface="Arial"/>
-            </a:endParaRPr>
-          </a:p>
-          <a:p>
-            <a:endParaRPr b="0" lang="en-CA" sz="1050" spc="-1" strike="noStrike">
-              <a:latin typeface="Arial"/>
-            </a:endParaRPr>
-          </a:p>
-          <a:p>
-            <a:endParaRPr b="0" lang="en-CA" sz="1050" spc="-1" strike="noStrike">
-              <a:latin typeface="Arial"/>
-            </a:endParaRPr>
-          </a:p>
-          <a:p>
-            <a:r>
-              <a:rPr b="0" lang="en-CA" sz="1800" spc="-1" strike="noStrike">
-                <a:solidFill>
-                  <a:srgbClr val="000000"/>
-                </a:solidFill>
-                <a:latin typeface="Arial"/>
-                <a:ea typeface="DejaVu Sans"/>
-              </a:rPr>
-              <a:t>2)</a:t>
-            </a:r>
-            <a:r>
-              <a:rPr b="0" lang="en-CA" sz="1800" spc="-1" strike="noStrike">
-                <a:solidFill>
-                  <a:srgbClr val="000000"/>
-                </a:solidFill>
-                <a:latin typeface="Arial"/>
-                <a:ea typeface="DejaVu Sans"/>
-              </a:rPr>
-              <a:t>	</a:t>
-            </a:r>
-            <a:r>
-              <a:rPr b="0" lang="en-CA" sz="1800" spc="-1" strike="noStrike">
-                <a:solidFill>
-                  <a:srgbClr val="000000"/>
-                </a:solidFill>
-                <a:latin typeface="Arial"/>
-                <a:ea typeface="DejaVu Sans"/>
-              </a:rPr>
-              <a:t>Click Create Free Account</a:t>
-            </a:r>
-            <a:endParaRPr b="0" lang="en-CA" sz="1800" spc="-1" strike="noStrike">
-              <a:latin typeface="Arial"/>
-            </a:endParaRPr>
-          </a:p>
-          <a:p>
-            <a:endParaRPr b="0" lang="en-CA" sz="1800" spc="-1" strike="noStrike">
-              <a:latin typeface="Arial"/>
-            </a:endParaRPr>
-          </a:p>
-          <a:p>
-            <a:r>
-              <a:rPr b="0" lang="en-CA" sz="1800" spc="-1" strike="noStrike">
-                <a:solidFill>
-                  <a:srgbClr val="000000"/>
-                </a:solidFill>
-                <a:latin typeface="Arial"/>
-                <a:ea typeface="DejaVu Sans"/>
-              </a:rPr>
-              <a:t>3)</a:t>
-            </a:r>
-            <a:r>
-              <a:rPr b="0" lang="en-CA" sz="1800" spc="-1" strike="noStrike">
-                <a:solidFill>
-                  <a:srgbClr val="000000"/>
-                </a:solidFill>
-                <a:latin typeface="Arial"/>
-                <a:ea typeface="DejaVu Sans"/>
-              </a:rPr>
-              <a:t>	</a:t>
-            </a:r>
-            <a:r>
-              <a:rPr b="0" lang="en-CA" sz="1800" spc="-1" strike="noStrike">
-                <a:solidFill>
-                  <a:srgbClr val="000000"/>
-                </a:solidFill>
-                <a:latin typeface="Arial"/>
-                <a:ea typeface="DejaVu Sans"/>
-              </a:rPr>
-              <a:t>Fill out the form</a:t>
-            </a:r>
-            <a:endParaRPr b="0" lang="en-CA" sz="1800" spc="-1" strike="noStrike">
-              <a:latin typeface="Arial"/>
-            </a:endParaRPr>
-          </a:p>
-          <a:p>
-            <a:endParaRPr b="0" lang="en-CA" sz="1800" spc="-1" strike="noStrike">
-              <a:latin typeface="Arial"/>
-            </a:endParaRPr>
-          </a:p>
-          <a:p>
-            <a:r>
-              <a:rPr b="0" lang="en-CA" sz="1800" spc="-1" strike="noStrike">
-                <a:solidFill>
-                  <a:srgbClr val="000000"/>
-                </a:solidFill>
-                <a:latin typeface="Arial"/>
-                <a:ea typeface="DejaVu Sans"/>
-              </a:rPr>
-              <a:t>4) </a:t>
-            </a:r>
-            <a:r>
-              <a:rPr b="0" lang="en-CA" sz="1800" spc="-1" strike="noStrike">
-                <a:solidFill>
-                  <a:srgbClr val="000000"/>
-                </a:solidFill>
-                <a:latin typeface="Arial"/>
-                <a:ea typeface="DejaVu Sans"/>
-              </a:rPr>
-              <a:t>	</a:t>
-            </a:r>
-            <a:r>
-              <a:rPr b="0" lang="en-CA" sz="1800" spc="-1" strike="noStrike">
-                <a:solidFill>
-                  <a:srgbClr val="000000"/>
-                </a:solidFill>
-                <a:latin typeface="Arial"/>
-                <a:ea typeface="DejaVu Sans"/>
-              </a:rPr>
-              <a:t>Click continue</a:t>
-            </a:r>
-            <a:endParaRPr b="0" lang="en-CA" sz="1800" spc="-1" strike="noStrike">
-              <a:latin typeface="Arial"/>
-            </a:endParaRPr>
-          </a:p>
-          <a:p>
-            <a:endParaRPr b="0" lang="en-CA" sz="1800" spc="-1" strike="noStrike">
-              <a:latin typeface="Arial"/>
-            </a:endParaRPr>
-          </a:p>
-          <a:p>
-            <a:r>
-              <a:rPr b="0" lang="en-CA" sz="1800" spc="-1" strike="noStrike">
-                <a:solidFill>
-                  <a:srgbClr val="000000"/>
-                </a:solidFill>
-                <a:latin typeface="Arial"/>
-                <a:ea typeface="DejaVu Sans"/>
-              </a:rPr>
-              <a:t>5)</a:t>
-            </a:r>
-            <a:r>
-              <a:rPr b="0" lang="en-CA" sz="1800" spc="-1" strike="noStrike">
-                <a:solidFill>
-                  <a:srgbClr val="000000"/>
-                </a:solidFill>
-                <a:latin typeface="Arial"/>
-                <a:ea typeface="DejaVu Sans"/>
-              </a:rPr>
-              <a:t>	</a:t>
-            </a:r>
-            <a:r>
-              <a:rPr b="0" lang="en-CA" sz="1800" spc="-1" strike="noStrike">
-                <a:solidFill>
-                  <a:srgbClr val="000000"/>
-                </a:solidFill>
-                <a:latin typeface="Arial"/>
-                <a:ea typeface="DejaVu Sans"/>
-              </a:rPr>
-              <a:t>Fill out that form</a:t>
-            </a:r>
-            <a:endParaRPr b="0" lang="en-CA" sz="1800" spc="-1" strike="noStrike">
-              <a:latin typeface="Arial"/>
-            </a:endParaRPr>
-          </a:p>
-          <a:p>
-            <a:endParaRPr b="0" lang="en-CA" sz="1800" spc="-1" strike="noStrike">
-              <a:latin typeface="Arial"/>
-            </a:endParaRPr>
-          </a:p>
-          <a:p>
-            <a:r>
-              <a:rPr b="0" lang="en-CA" sz="1800" spc="-1" strike="noStrike">
-                <a:solidFill>
-                  <a:srgbClr val="000000"/>
-                </a:solidFill>
-                <a:latin typeface="Arial"/>
-                <a:ea typeface="DejaVu Sans"/>
-              </a:rPr>
-              <a:t>6)</a:t>
-            </a:r>
-            <a:r>
-              <a:rPr b="0" lang="en-CA" sz="1800" spc="-1" strike="noStrike">
-                <a:solidFill>
-                  <a:srgbClr val="000000"/>
-                </a:solidFill>
-                <a:latin typeface="Arial"/>
-                <a:ea typeface="DejaVu Sans"/>
-              </a:rPr>
-              <a:t>	</a:t>
-            </a:r>
-            <a:r>
-              <a:rPr b="0" lang="en-CA" sz="1800" spc="-1" strike="noStrike">
-                <a:solidFill>
-                  <a:srgbClr val="000000"/>
-                </a:solidFill>
-                <a:latin typeface="Arial"/>
-                <a:ea typeface="DejaVu Sans"/>
-              </a:rPr>
-              <a:t>Click Create Account and Continue</a:t>
-            </a:r>
-            <a:endParaRPr b="0" lang="en-CA" sz="1800" spc="-1" strike="noStrike">
-              <a:latin typeface="Arial"/>
-            </a:endParaRPr>
-          </a:p>
-          <a:p>
-            <a:endParaRPr b="0" lang="en-CA" sz="1800" spc="-1" strike="noStrike">
-              <a:latin typeface="Arial"/>
-            </a:endParaRPr>
-          </a:p>
-          <a:p>
-            <a:endParaRPr b="0" lang="en-CA" sz="1800" spc="-1" strike="noStrike">
-              <a:latin typeface="Arial"/>
-            </a:endParaRPr>
-          </a:p>
-          <a:p>
-            <a:endParaRPr b="0" lang="en-CA" sz="1800" spc="-1" strike="noStrike">
-              <a:latin typeface="Arial"/>
-            </a:endParaRPr>
-          </a:p>
-        </p:txBody>
       </p:sp>
     </p:spTree>
   </p:cSld>
@@ -12634,14 +12466,14 @@
       </p:grpSpPr>
       <p:sp>
         <p:nvSpPr>
-          <p:cNvPr id="251" name="CustomShape 1"/>
+          <p:cNvPr id="247" name="CustomShape 1"/>
           <p:cNvSpPr/>
           <p:nvPr/>
         </p:nvSpPr>
         <p:spPr>
           <a:xfrm>
             <a:off x="504000" y="1269360"/>
-            <a:ext cx="8275680" cy="5215680"/>
+            <a:ext cx="8274600" cy="5214600"/>
           </a:xfrm>
           <a:prstGeom prst="rect">
             <a:avLst/>
@@ -12669,25 +12501,21 @@
             </a:pPr>
             <a:r>
               <a:rPr b="1" lang="en-CA" sz="1800" spc="-1" strike="noStrike">
-                <a:solidFill>
-                  <a:srgbClr val="000000"/>
-                </a:solidFill>
                 <a:latin typeface="Arial"/>
-                <a:ea typeface="DejaVu Sans"/>
-              </a:rPr>
-              <a:t>Setting up our AWS Account (continued: )</a:t>
-            </a:r>
-            <a:endParaRPr b="0" lang="en-CA" sz="1800" spc="-1" strike="noStrike">
-              <a:latin typeface="Arial"/>
-            </a:endParaRPr>
-          </a:p>
-          <a:p>
-            <a:pPr>
-              <a:lnSpc>
-                <a:spcPct val="100000"/>
-              </a:lnSpc>
-            </a:pPr>
-            <a:endParaRPr b="0" lang="en-CA" sz="1800" spc="-1" strike="noStrike">
+              </a:rPr>
+              <a:t>Installing Ansible:</a:t>
+            </a:r>
+            <a:endParaRPr b="1" lang="en-CA" sz="1800" spc="-1" strike="noStrike">
+              <a:latin typeface="Arial"/>
+            </a:endParaRPr>
+          </a:p>
+          <a:p>
+            <a:pPr>
+              <a:lnSpc>
+                <a:spcPct val="100000"/>
+              </a:lnSpc>
+            </a:pPr>
+            <a:endParaRPr b="1" lang="en-CA" sz="1800" spc="-1" strike="noStrike">
               <a:latin typeface="Arial"/>
             </a:endParaRPr>
           </a:p>
@@ -12699,371 +12527,53 @@
             </a:pPr>
             <a:r>
               <a:rPr b="0" lang="en-CA" sz="1800" spc="-1" strike="noStrike">
-                <a:solidFill>
-                  <a:srgbClr val="000000"/>
-                </a:solidFill>
                 <a:latin typeface="Arial"/>
-                <a:ea typeface="DejaVu Sans"/>
-              </a:rPr>
-              <a:t>7) </a:t>
-            </a:r>
+              </a:rPr>
+              <a:t>The video shows that we’re installing on ubuntu 18.04, but that’s ok.  The procedure is the same on ubuntu 19.04</a:t>
+            </a:r>
+            <a:endParaRPr b="1" lang="en-CA" sz="1800" spc="-1" strike="noStrike">
+              <a:latin typeface="Arial"/>
+            </a:endParaRPr>
+          </a:p>
+          <a:p>
+            <a:pPr>
+              <a:lnSpc>
+                <a:spcPct val="100000"/>
+              </a:lnSpc>
+            </a:pPr>
+            <a:endParaRPr b="1" lang="en-CA" sz="1800" spc="-1" strike="noStrike">
+              <a:latin typeface="Arial"/>
+            </a:endParaRPr>
+          </a:p>
+          <a:p>
+            <a:pPr>
+              <a:lnSpc>
+                <a:spcPct val="100000"/>
+              </a:lnSpc>
+            </a:pPr>
             <a:r>
               <a:rPr b="0" lang="en-CA" sz="1800" spc="-1" strike="noStrike">
-                <a:solidFill>
-                  <a:srgbClr val="000000"/>
-                </a:solidFill>
                 <a:latin typeface="Arial"/>
-                <a:ea typeface="DejaVu Sans"/>
-              </a:rPr>
-              <a:t>	</a:t>
-            </a:r>
-            <a:r>
-              <a:rPr b="0" lang="en-CA" sz="1800" spc="-1" strike="noStrike">
-                <a:solidFill>
-                  <a:srgbClr val="000000"/>
-                </a:solidFill>
-                <a:latin typeface="Arial"/>
-                <a:ea typeface="DejaVu Sans"/>
-              </a:rPr>
-              <a:t>Fill out the credit card information:</a:t>
-            </a:r>
-            <a:endParaRPr b="0" lang="en-CA" sz="1800" spc="-1" strike="noStrike">
-              <a:latin typeface="Arial"/>
-            </a:endParaRPr>
-          </a:p>
-          <a:p>
-            <a:pPr>
-              <a:lnSpc>
-                <a:spcPct val="100000"/>
-              </a:lnSpc>
-            </a:pPr>
-            <a:r>
-              <a:rPr b="0" lang="en-CA" sz="1800" spc="-1" strike="noStrike">
-                <a:solidFill>
-                  <a:srgbClr val="000000"/>
-                </a:solidFill>
-                <a:latin typeface="Arial"/>
-                <a:ea typeface="DejaVu Sans"/>
-              </a:rPr>
-              <a:t>8)</a:t>
-            </a:r>
-            <a:r>
-              <a:rPr b="0" lang="en-CA" sz="1800" spc="-1" strike="noStrike">
-                <a:solidFill>
-                  <a:srgbClr val="000000"/>
-                </a:solidFill>
-                <a:latin typeface="Arial"/>
-                <a:ea typeface="DejaVu Sans"/>
-              </a:rPr>
-              <a:t>	</a:t>
-            </a:r>
-            <a:r>
-              <a:rPr b="0" lang="en-CA" sz="1800" spc="-1" strike="noStrike">
-                <a:solidFill>
-                  <a:srgbClr val="000000"/>
-                </a:solidFill>
-                <a:latin typeface="Arial"/>
-                <a:ea typeface="DejaVu Sans"/>
-              </a:rPr>
-              <a:t>Log in to the aws console with the account id and password </a:t>
-            </a:r>
-            <a:endParaRPr b="0" lang="en-CA" sz="1800" spc="-1" strike="noStrike">
-              <a:latin typeface="Arial"/>
-            </a:endParaRPr>
-          </a:p>
-          <a:p>
-            <a:pPr>
-              <a:lnSpc>
-                <a:spcPct val="100000"/>
-              </a:lnSpc>
-            </a:pPr>
-            <a:r>
-              <a:rPr b="0" lang="en-CA" sz="1800" spc="-1" strike="noStrike">
-                <a:solidFill>
-                  <a:srgbClr val="000000"/>
-                </a:solidFill>
-                <a:latin typeface="Arial"/>
-                <a:ea typeface="DejaVu Sans"/>
-              </a:rPr>
-              <a:t>	</a:t>
-            </a:r>
-            <a:r>
-              <a:rPr b="0" lang="en-CA" sz="1800" spc="-1" strike="noStrike">
-                <a:solidFill>
-                  <a:srgbClr val="000000"/>
-                </a:solidFill>
-                <a:latin typeface="Arial"/>
-                <a:ea typeface="DejaVu Sans"/>
-              </a:rPr>
-              <a:t>we just created.</a:t>
-            </a:r>
-            <a:endParaRPr b="0" lang="en-CA" sz="1800" spc="-1" strike="noStrike">
-              <a:latin typeface="Arial"/>
-            </a:endParaRPr>
-          </a:p>
-          <a:p>
-            <a:pPr>
-              <a:lnSpc>
-                <a:spcPct val="100000"/>
-              </a:lnSpc>
-            </a:pPr>
-            <a:endParaRPr b="0" lang="en-CA" sz="1800" spc="-1" strike="noStrike">
-              <a:latin typeface="Arial"/>
-            </a:endParaRPr>
-          </a:p>
-          <a:p>
-            <a:pPr>
-              <a:lnSpc>
-                <a:spcPct val="100000"/>
-              </a:lnSpc>
-            </a:pPr>
-            <a:r>
-              <a:rPr b="0" lang="en-CA" sz="1800" spc="-1" strike="noStrike">
-                <a:solidFill>
-                  <a:srgbClr val="000000"/>
-                </a:solidFill>
-                <a:latin typeface="Arial"/>
-                <a:ea typeface="DejaVu Sans"/>
-              </a:rPr>
-              <a:t>	</a:t>
-            </a:r>
-            <a:r>
-              <a:rPr b="0" lang="en-CA" sz="1800" spc="-1" strike="noStrike">
-                <a:solidFill>
-                  <a:srgbClr val="000000"/>
-                </a:solidFill>
-                <a:latin typeface="Arial"/>
-                <a:ea typeface="DejaVu Sans"/>
-              </a:rPr>
-              <a:t>email we chose</a:t>
-            </a:r>
-            <a:endParaRPr b="0" lang="en-CA" sz="1800" spc="-1" strike="noStrike">
-              <a:latin typeface="Arial"/>
-            </a:endParaRPr>
-          </a:p>
-          <a:p>
-            <a:pPr>
-              <a:lnSpc>
-                <a:spcPct val="100000"/>
-              </a:lnSpc>
-            </a:pPr>
-            <a:r>
-              <a:rPr b="0" lang="en-CA" sz="1800" spc="-1" strike="noStrike">
-                <a:solidFill>
-                  <a:srgbClr val="000000"/>
-                </a:solidFill>
-                <a:latin typeface="Arial"/>
-                <a:ea typeface="DejaVu Sans"/>
-              </a:rPr>
-              <a:t>	</a:t>
-            </a:r>
-            <a:r>
-              <a:rPr b="0" lang="en-CA" sz="1800" spc="-1" strike="noStrike">
-                <a:solidFill>
-                  <a:srgbClr val="000000"/>
-                </a:solidFill>
-                <a:latin typeface="Arial"/>
-                <a:ea typeface="DejaVu Sans"/>
-              </a:rPr>
-              <a:t>password we chose </a:t>
-            </a:r>
-            <a:endParaRPr b="0" lang="en-CA" sz="1800" spc="-1" strike="noStrike">
-              <a:latin typeface="Arial"/>
-            </a:endParaRPr>
-          </a:p>
-          <a:p>
-            <a:pPr>
-              <a:lnSpc>
-                <a:spcPct val="100000"/>
-              </a:lnSpc>
-            </a:pPr>
-            <a:endParaRPr b="0" lang="en-CA" sz="1800" spc="-1" strike="noStrike">
-              <a:latin typeface="Arial"/>
-            </a:endParaRPr>
-          </a:p>
-          <a:p>
-            <a:pPr>
-              <a:lnSpc>
-                <a:spcPct val="100000"/>
-              </a:lnSpc>
-            </a:pPr>
-            <a:r>
-              <a:rPr b="0" lang="en-CA" sz="1800" spc="-1" strike="noStrike">
-                <a:solidFill>
-                  <a:srgbClr val="000000"/>
-                </a:solidFill>
-                <a:latin typeface="Arial"/>
-                <a:ea typeface="DejaVu Sans"/>
-              </a:rPr>
-              <a:t>	</a:t>
-            </a:r>
-            <a:r>
-              <a:rPr b="0" lang="en-CA" sz="1800" spc="-1" strike="noStrike">
-                <a:solidFill>
-                  <a:srgbClr val="000000"/>
-                </a:solidFill>
-                <a:latin typeface="Arial"/>
-                <a:ea typeface="DejaVu Sans"/>
-              </a:rPr>
-              <a:t>resource to install:</a:t>
-            </a:r>
-            <a:endParaRPr b="0" lang="en-CA" sz="1800" spc="-1" strike="noStrike">
-              <a:latin typeface="Arial"/>
-            </a:endParaRPr>
-          </a:p>
-          <a:p>
-            <a:pPr>
-              <a:lnSpc>
-                <a:spcPct val="100000"/>
-              </a:lnSpc>
-            </a:pPr>
-            <a:endParaRPr b="0" lang="en-CA" sz="1800" spc="-1" strike="noStrike">
-              <a:latin typeface="Arial"/>
-            </a:endParaRPr>
-          </a:p>
-          <a:p>
-            <a:pPr>
-              <a:lnSpc>
-                <a:spcPct val="100000"/>
-              </a:lnSpc>
-            </a:pPr>
-            <a:r>
-              <a:rPr b="0" lang="en-CA" sz="1800" spc="-1" strike="noStrike">
-                <a:solidFill>
-                  <a:srgbClr val="000000"/>
-                </a:solidFill>
-                <a:latin typeface="Arial"/>
-                <a:ea typeface="DejaVu Sans"/>
-              </a:rPr>
-              <a:t>	</a:t>
-            </a:r>
-            <a:r>
-              <a:rPr b="0" lang="en-CA" sz="1800" spc="-1" strike="noStrike">
-                <a:solidFill>
-                  <a:srgbClr val="000000"/>
-                </a:solidFill>
-                <a:latin typeface="Arial"/>
-                <a:ea typeface="DejaVu Sans"/>
                 <a:hlinkClick r:id="rId1"/>
               </a:rPr>
-              <a:t> https://www.youtube.com/watch?v=XhW17g73fvY</a:t>
-            </a:r>
-            <a:endParaRPr b="0" lang="en-CA" sz="1800" spc="-1" strike="noStrike">
-              <a:latin typeface="Arial"/>
-            </a:endParaRPr>
-          </a:p>
-          <a:p>
-            <a:pPr>
-              <a:lnSpc>
-                <a:spcPct val="100000"/>
-              </a:lnSpc>
-            </a:pPr>
-            <a:endParaRPr b="0" lang="en-CA" sz="1800" spc="-1" strike="noStrike">
-              <a:latin typeface="Arial"/>
-            </a:endParaRPr>
-          </a:p>
-          <a:p>
-            <a:pPr>
-              <a:lnSpc>
-                <a:spcPct val="100000"/>
-              </a:lnSpc>
-            </a:pPr>
-            <a:endParaRPr b="0" lang="en-CA" sz="1800" spc="-1" strike="noStrike">
-              <a:latin typeface="Arial"/>
-            </a:endParaRPr>
-          </a:p>
-          <a:p>
-            <a:pPr>
-              <a:lnSpc>
-                <a:spcPct val="100000"/>
-              </a:lnSpc>
-            </a:pPr>
-            <a:r>
-              <a:rPr b="0" lang="en-CA" sz="1800" spc="-1" strike="noStrike">
-                <a:solidFill>
-                  <a:srgbClr val="000000"/>
-                </a:solidFill>
-                <a:latin typeface="Arial"/>
-                <a:ea typeface="DejaVu Sans"/>
-              </a:rPr>
-              <a:t>	</a:t>
-            </a:r>
-            <a:endParaRPr b="0" lang="en-CA" sz="1800" spc="-1" strike="noStrike">
-              <a:latin typeface="Arial"/>
-            </a:endParaRPr>
-          </a:p>
-          <a:p>
-            <a:pPr>
-              <a:lnSpc>
-                <a:spcPct val="100000"/>
-              </a:lnSpc>
-            </a:pPr>
-            <a:endParaRPr b="0" lang="en-CA" sz="1800" spc="-1" strike="noStrike">
-              <a:latin typeface="Arial"/>
-            </a:endParaRPr>
-          </a:p>
-          <a:p>
-            <a:pPr>
-              <a:lnSpc>
-                <a:spcPct val="100000"/>
-              </a:lnSpc>
-            </a:pPr>
-            <a:endParaRPr b="0" lang="en-CA" sz="1800" spc="-1" strike="noStrike">
-              <a:latin typeface="Arial"/>
-            </a:endParaRPr>
-          </a:p>
-          <a:p>
-            <a:pPr>
-              <a:lnSpc>
-                <a:spcPct val="100000"/>
-              </a:lnSpc>
-            </a:pPr>
-            <a:r>
-              <a:rPr b="0" lang="en-CA" sz="1050" spc="-1" strike="noStrike">
-                <a:solidFill>
-                  <a:srgbClr val="000000"/>
-                </a:solidFill>
-                <a:latin typeface="Arial"/>
-                <a:ea typeface="DejaVu Sans"/>
-              </a:rPr>
-              <a:t>	</a:t>
-            </a:r>
-            <a:r>
-              <a:rPr b="0" lang="en-CA" sz="1050" spc="-1" strike="noStrike">
-                <a:solidFill>
-                  <a:srgbClr val="000000"/>
-                </a:solidFill>
-                <a:latin typeface="Arial"/>
-                <a:ea typeface="DejaVu Sans"/>
-              </a:rPr>
-              <a:t>	</a:t>
-            </a:r>
-            <a:r>
-              <a:rPr b="0" lang="en-CA" sz="1050" spc="-1" strike="noStrike">
-                <a:solidFill>
-                  <a:srgbClr val="000000"/>
-                </a:solidFill>
-                <a:latin typeface="Arial"/>
-                <a:ea typeface="DejaVu Sans"/>
-              </a:rPr>
-              <a:t>            </a:t>
-            </a:r>
-            <a:endParaRPr b="0" lang="en-CA" sz="1050" spc="-1" strike="noStrike">
-              <a:latin typeface="Arial"/>
-            </a:endParaRPr>
-          </a:p>
-        </p:txBody>
-      </p:sp>
-      <p:sp>
-        <p:nvSpPr>
-          <p:cNvPr id="252" name="CustomShape 2"/>
+              <a:t>https://www.techrepublic.com/article/how-to-install-ansible-on-ubuntu-server-18-04/</a:t>
+            </a:r>
+            <a:endParaRPr b="1" lang="en-CA" sz="1800" spc="-1" strike="noStrike">
+              <a:latin typeface="Arial"/>
+            </a:endParaRPr>
+          </a:p>
+        </p:txBody>
+      </p:sp>
+      <p:sp>
+        <p:nvSpPr>
+          <p:cNvPr id="248" name="CustomShape 2"/>
           <p:cNvSpPr/>
           <p:nvPr/>
         </p:nvSpPr>
         <p:spPr>
           <a:xfrm>
             <a:off x="432000" y="0"/>
-            <a:ext cx="7448040" cy="1180080"/>
+            <a:ext cx="7446960" cy="1179000"/>
           </a:xfrm>
           <a:prstGeom prst="rect">
             <a:avLst/>
@@ -13127,14 +12637,14 @@
       </p:sp>
       <p:sp>
         <p:nvSpPr>
-          <p:cNvPr id="253" name="CustomShape 3"/>
+          <p:cNvPr id="249" name="CustomShape 3"/>
           <p:cNvSpPr/>
           <p:nvPr/>
         </p:nvSpPr>
         <p:spPr>
           <a:xfrm>
             <a:off x="0" y="0"/>
-            <a:ext cx="247320" cy="1192320"/>
+            <a:ext cx="246240" cy="1191240"/>
           </a:xfrm>
           <a:prstGeom prst="rect">
             <a:avLst/>
@@ -13163,7 +12673,7 @@
       </p:sp>
       <p:sp>
         <p:nvSpPr>
-          <p:cNvPr id="254" name="Line 4"/>
+          <p:cNvPr id="250" name="Line 4"/>
           <p:cNvSpPr/>
           <p:nvPr/>
         </p:nvSpPr>
@@ -13204,6 +12714,1258 @@
           <p:childTnLst>
             <p:seq>
               <p:cTn id="48" dur="indefinite" nodeType="mainSeq"/>
+              <p:prevCondLst>
+                <p:cond delay="0" evt="onPrev">
+                  <p:tgtEl>
+                    <p:sldTgt/>
+                  </p:tgtEl>
+                </p:cond>
+              </p:prevCondLst>
+              <p:nextCondLst>
+                <p:cond delay="0" evt="onNext">
+                  <p:tgtEl>
+                    <p:sldTgt/>
+                  </p:tgtEl>
+                </p:cond>
+              </p:nextCondLst>
+            </p:seq>
+          </p:childTnLst>
+        </p:cTn>
+      </p:par>
+    </p:tnLst>
+  </p:timing>
+</p:sld>
+</file>
+
+<file path=ppt/slides/slide25.xml><?xml version="1.0" encoding="utf-8"?>
+<p:sld xmlns:a="http://schemas.openxmlformats.org/drawingml/2006/main" xmlns:p="http://schemas.openxmlformats.org/presentationml/2006/main" xmlns:r="http://schemas.openxmlformats.org/officeDocument/2006/relationships" xmlns:p14="http://schemas.microsoft.com/office/powerpoint/2010/main" xmlns:p15="http://schemas.microsoft.com/office/powerpoint/2012/main" xmlns:mc="http://schemas.openxmlformats.org/markup-compatibility/2006">
+  <p:cSld>
+    <p:spTree>
+      <p:nvGrpSpPr>
+        <p:cNvPr id="1" name=""/>
+        <p:cNvGrpSpPr/>
+        <p:nvPr/>
+      </p:nvGrpSpPr>
+      <p:grpSpPr>
+        <a:xfrm>
+          <a:off x="0" y="0"/>
+          <a:ext cx="0" cy="0"/>
+          <a:chOff x="0" y="0"/>
+          <a:chExt cx="0" cy="0"/>
+        </a:xfrm>
+      </p:grpSpPr>
+      <p:sp>
+        <p:nvSpPr>
+          <p:cNvPr id="251" name="CustomShape 1"/>
+          <p:cNvSpPr/>
+          <p:nvPr/>
+        </p:nvSpPr>
+        <p:spPr>
+          <a:xfrm>
+            <a:off x="457200" y="273600"/>
+            <a:ext cx="8226360" cy="1141920"/>
+          </a:xfrm>
+          <a:prstGeom prst="rect">
+            <a:avLst/>
+          </a:prstGeom>
+          <a:noFill/>
+          <a:ln>
+            <a:noFill/>
+          </a:ln>
+        </p:spPr>
+        <p:style>
+          <a:lnRef idx="0"/>
+          <a:fillRef idx="0"/>
+          <a:effectRef idx="0"/>
+          <a:fontRef idx="minor"/>
+        </p:style>
+      </p:sp>
+      <p:sp>
+        <p:nvSpPr>
+          <p:cNvPr id="252" name="CustomShape 2"/>
+          <p:cNvSpPr/>
+          <p:nvPr/>
+        </p:nvSpPr>
+        <p:spPr>
+          <a:xfrm>
+            <a:off x="457200" y="1604520"/>
+            <a:ext cx="2646720" cy="1893960"/>
+          </a:xfrm>
+          <a:prstGeom prst="rect">
+            <a:avLst/>
+          </a:prstGeom>
+          <a:noFill/>
+          <a:ln>
+            <a:noFill/>
+          </a:ln>
+        </p:spPr>
+        <p:style>
+          <a:lnRef idx="0"/>
+          <a:fillRef idx="0"/>
+          <a:effectRef idx="0"/>
+          <a:fontRef idx="minor"/>
+        </p:style>
+      </p:sp>
+      <p:sp>
+        <p:nvSpPr>
+          <p:cNvPr id="253" name="CustomShape 3"/>
+          <p:cNvSpPr/>
+          <p:nvPr/>
+        </p:nvSpPr>
+        <p:spPr>
+          <a:xfrm>
+            <a:off x="3239640" y="1604520"/>
+            <a:ext cx="2646720" cy="1893960"/>
+          </a:xfrm>
+          <a:prstGeom prst="rect">
+            <a:avLst/>
+          </a:prstGeom>
+          <a:noFill/>
+          <a:ln>
+            <a:noFill/>
+          </a:ln>
+        </p:spPr>
+        <p:style>
+          <a:lnRef idx="0"/>
+          <a:fillRef idx="0"/>
+          <a:effectRef idx="0"/>
+          <a:fontRef idx="minor"/>
+        </p:style>
+      </p:sp>
+      <p:sp>
+        <p:nvSpPr>
+          <p:cNvPr id="254" name="CustomShape 4"/>
+          <p:cNvSpPr/>
+          <p:nvPr/>
+        </p:nvSpPr>
+        <p:spPr>
+          <a:xfrm>
+            <a:off x="6022080" y="1604520"/>
+            <a:ext cx="2646720" cy="1893960"/>
+          </a:xfrm>
+          <a:prstGeom prst="rect">
+            <a:avLst/>
+          </a:prstGeom>
+          <a:noFill/>
+          <a:ln>
+            <a:noFill/>
+          </a:ln>
+        </p:spPr>
+        <p:style>
+          <a:lnRef idx="0"/>
+          <a:fillRef idx="0"/>
+          <a:effectRef idx="0"/>
+          <a:fontRef idx="minor"/>
+        </p:style>
+      </p:sp>
+      <p:sp>
+        <p:nvSpPr>
+          <p:cNvPr id="255" name="CustomShape 5"/>
+          <p:cNvSpPr/>
+          <p:nvPr/>
+        </p:nvSpPr>
+        <p:spPr>
+          <a:xfrm>
+            <a:off x="457200" y="3682080"/>
+            <a:ext cx="2646720" cy="1893960"/>
+          </a:xfrm>
+          <a:prstGeom prst="rect">
+            <a:avLst/>
+          </a:prstGeom>
+          <a:noFill/>
+          <a:ln>
+            <a:noFill/>
+          </a:ln>
+        </p:spPr>
+        <p:style>
+          <a:lnRef idx="0"/>
+          <a:fillRef idx="0"/>
+          <a:effectRef idx="0"/>
+          <a:fontRef idx="minor"/>
+        </p:style>
+      </p:sp>
+      <p:sp>
+        <p:nvSpPr>
+          <p:cNvPr id="256" name="CustomShape 6"/>
+          <p:cNvSpPr/>
+          <p:nvPr/>
+        </p:nvSpPr>
+        <p:spPr>
+          <a:xfrm>
+            <a:off x="3239640" y="3682080"/>
+            <a:ext cx="2646720" cy="1893960"/>
+          </a:xfrm>
+          <a:prstGeom prst="rect">
+            <a:avLst/>
+          </a:prstGeom>
+          <a:noFill/>
+          <a:ln>
+            <a:noFill/>
+          </a:ln>
+        </p:spPr>
+        <p:style>
+          <a:lnRef idx="0"/>
+          <a:fillRef idx="0"/>
+          <a:effectRef idx="0"/>
+          <a:fontRef idx="minor"/>
+        </p:style>
+      </p:sp>
+      <p:sp>
+        <p:nvSpPr>
+          <p:cNvPr id="257" name="CustomShape 7"/>
+          <p:cNvSpPr/>
+          <p:nvPr/>
+        </p:nvSpPr>
+        <p:spPr>
+          <a:xfrm>
+            <a:off x="6022080" y="3682080"/>
+            <a:ext cx="2646720" cy="1893960"/>
+          </a:xfrm>
+          <a:prstGeom prst="rect">
+            <a:avLst/>
+          </a:prstGeom>
+          <a:noFill/>
+          <a:ln>
+            <a:noFill/>
+          </a:ln>
+        </p:spPr>
+        <p:style>
+          <a:lnRef idx="0"/>
+          <a:fillRef idx="0"/>
+          <a:effectRef idx="0"/>
+          <a:fontRef idx="minor"/>
+        </p:style>
+      </p:sp>
+      <p:sp>
+        <p:nvSpPr>
+          <p:cNvPr id="258" name="CustomShape 8"/>
+          <p:cNvSpPr/>
+          <p:nvPr/>
+        </p:nvSpPr>
+        <p:spPr>
+          <a:xfrm>
+            <a:off x="666720" y="1148760"/>
+            <a:ext cx="7865280" cy="4588920"/>
+          </a:xfrm>
+          <a:prstGeom prst="rect">
+            <a:avLst/>
+          </a:prstGeom>
+          <a:noFill/>
+          <a:ln>
+            <a:noFill/>
+          </a:ln>
+        </p:spPr>
+        <p:style>
+          <a:lnRef idx="0"/>
+          <a:fillRef idx="0"/>
+          <a:effectRef idx="0"/>
+          <a:fontRef idx="minor"/>
+        </p:style>
+        <p:txBody>
+          <a:bodyPr lIns="90000" rIns="90000" tIns="45000" bIns="45000"/>
+          <a:p>
+            <a:pPr>
+              <a:lnSpc>
+                <a:spcPct val="100000"/>
+              </a:lnSpc>
+            </a:pPr>
+            <a:r>
+              <a:rPr b="1" lang="en-CA" sz="1800" spc="-1" strike="noStrike">
+                <a:solidFill>
+                  <a:srgbClr val="000000"/>
+                </a:solidFill>
+                <a:latin typeface="Arial"/>
+                <a:ea typeface="DejaVu Sans"/>
+              </a:rPr>
+              <a:t>Setting up our AWS Account (we’re using the free tier)</a:t>
+            </a:r>
+            <a:endParaRPr b="0" lang="en-CA" sz="1800" spc="-1" strike="noStrike">
+              <a:latin typeface="Arial"/>
+            </a:endParaRPr>
+          </a:p>
+          <a:p>
+            <a:pPr>
+              <a:lnSpc>
+                <a:spcPct val="100000"/>
+              </a:lnSpc>
+            </a:pPr>
+            <a:endParaRPr b="0" lang="en-CA" sz="1800" spc="-1" strike="noStrike">
+              <a:latin typeface="Arial"/>
+            </a:endParaRPr>
+          </a:p>
+          <a:p>
+            <a:pPr>
+              <a:lnSpc>
+                <a:spcPct val="100000"/>
+              </a:lnSpc>
+            </a:pPr>
+            <a:r>
+              <a:rPr b="0" lang="en-CA" sz="1800" spc="-1" strike="noStrike">
+                <a:solidFill>
+                  <a:srgbClr val="000000"/>
+                </a:solidFill>
+                <a:latin typeface="Arial"/>
+                <a:ea typeface="DejaVu Sans"/>
+              </a:rPr>
+              <a:t>1) Browse to : </a:t>
+            </a:r>
+            <a:endParaRPr b="0" lang="en-CA" sz="1800" spc="-1" strike="noStrike">
+              <a:latin typeface="Arial"/>
+            </a:endParaRPr>
+          </a:p>
+          <a:p>
+            <a:pPr>
+              <a:lnSpc>
+                <a:spcPct val="100000"/>
+              </a:lnSpc>
+            </a:pPr>
+            <a:r>
+              <a:rPr b="0" lang="en-CA" sz="1050" spc="-1" strike="noStrike">
+                <a:solidFill>
+                  <a:srgbClr val="000000"/>
+                </a:solidFill>
+                <a:latin typeface="Arial"/>
+                <a:ea typeface="DejaVu Sans"/>
+              </a:rPr>
+              <a:t>                                     </a:t>
+            </a:r>
+            <a:r>
+              <a:rPr b="0" lang="en-CA" sz="1050" spc="-1" strike="noStrike" u="sng">
+                <a:solidFill>
+                  <a:srgbClr val="0000ff"/>
+                </a:solidFill>
+                <a:uFillTx/>
+                <a:latin typeface="Arial"/>
+                <a:ea typeface="DejaVu Sans"/>
+                <a:hlinkClick r:id="rId1"/>
+              </a:rPr>
+              <a:t>https://aws.amazon.com/free/?all-free-tier.sort-by=item.additionalFields.SortRank&amp;all-free-tier.sort-order=asc</a:t>
+            </a:r>
+            <a:endParaRPr b="0" lang="en-CA" sz="1050" spc="-1" strike="noStrike">
+              <a:latin typeface="Arial"/>
+            </a:endParaRPr>
+          </a:p>
+          <a:p>
+            <a:pPr>
+              <a:lnSpc>
+                <a:spcPct val="100000"/>
+              </a:lnSpc>
+            </a:pPr>
+            <a:endParaRPr b="0" lang="en-CA" sz="1050" spc="-1" strike="noStrike">
+              <a:latin typeface="Arial"/>
+            </a:endParaRPr>
+          </a:p>
+          <a:p>
+            <a:pPr>
+              <a:lnSpc>
+                <a:spcPct val="100000"/>
+              </a:lnSpc>
+            </a:pPr>
+            <a:endParaRPr b="0" lang="en-CA" sz="1050" spc="-1" strike="noStrike">
+              <a:latin typeface="Arial"/>
+            </a:endParaRPr>
+          </a:p>
+          <a:p>
+            <a:pPr>
+              <a:lnSpc>
+                <a:spcPct val="100000"/>
+              </a:lnSpc>
+            </a:pPr>
+            <a:r>
+              <a:rPr b="0" lang="en-CA" sz="1800" spc="-1" strike="noStrike">
+                <a:solidFill>
+                  <a:srgbClr val="000000"/>
+                </a:solidFill>
+                <a:latin typeface="Arial"/>
+                <a:ea typeface="DejaVu Sans"/>
+              </a:rPr>
+              <a:t>2)</a:t>
+            </a:r>
+            <a:r>
+              <a:rPr b="0" lang="en-CA" sz="1800" spc="-1" strike="noStrike">
+                <a:solidFill>
+                  <a:srgbClr val="000000"/>
+                </a:solidFill>
+                <a:latin typeface="Arial"/>
+                <a:ea typeface="DejaVu Sans"/>
+              </a:rPr>
+              <a:t>	</a:t>
+            </a:r>
+            <a:r>
+              <a:rPr b="0" lang="en-CA" sz="1800" spc="-1" strike="noStrike">
+                <a:solidFill>
+                  <a:srgbClr val="000000"/>
+                </a:solidFill>
+                <a:latin typeface="Arial"/>
+                <a:ea typeface="DejaVu Sans"/>
+              </a:rPr>
+              <a:t>Click Create Free Account</a:t>
+            </a:r>
+            <a:endParaRPr b="0" lang="en-CA" sz="1800" spc="-1" strike="noStrike">
+              <a:latin typeface="Arial"/>
+            </a:endParaRPr>
+          </a:p>
+          <a:p>
+            <a:pPr>
+              <a:lnSpc>
+                <a:spcPct val="100000"/>
+              </a:lnSpc>
+            </a:pPr>
+            <a:endParaRPr b="0" lang="en-CA" sz="1800" spc="-1" strike="noStrike">
+              <a:latin typeface="Arial"/>
+            </a:endParaRPr>
+          </a:p>
+          <a:p>
+            <a:pPr>
+              <a:lnSpc>
+                <a:spcPct val="100000"/>
+              </a:lnSpc>
+            </a:pPr>
+            <a:r>
+              <a:rPr b="0" lang="en-CA" sz="1800" spc="-1" strike="noStrike">
+                <a:solidFill>
+                  <a:srgbClr val="000000"/>
+                </a:solidFill>
+                <a:latin typeface="Arial"/>
+                <a:ea typeface="DejaVu Sans"/>
+              </a:rPr>
+              <a:t>3)</a:t>
+            </a:r>
+            <a:r>
+              <a:rPr b="0" lang="en-CA" sz="1800" spc="-1" strike="noStrike">
+                <a:solidFill>
+                  <a:srgbClr val="000000"/>
+                </a:solidFill>
+                <a:latin typeface="Arial"/>
+                <a:ea typeface="DejaVu Sans"/>
+              </a:rPr>
+              <a:t>	</a:t>
+            </a:r>
+            <a:r>
+              <a:rPr b="0" lang="en-CA" sz="1800" spc="-1" strike="noStrike">
+                <a:solidFill>
+                  <a:srgbClr val="000000"/>
+                </a:solidFill>
+                <a:latin typeface="Arial"/>
+                <a:ea typeface="DejaVu Sans"/>
+              </a:rPr>
+              <a:t>Fill out the form</a:t>
+            </a:r>
+            <a:endParaRPr b="0" lang="en-CA" sz="1800" spc="-1" strike="noStrike">
+              <a:latin typeface="Arial"/>
+            </a:endParaRPr>
+          </a:p>
+          <a:p>
+            <a:pPr>
+              <a:lnSpc>
+                <a:spcPct val="100000"/>
+              </a:lnSpc>
+            </a:pPr>
+            <a:endParaRPr b="0" lang="en-CA" sz="1800" spc="-1" strike="noStrike">
+              <a:latin typeface="Arial"/>
+            </a:endParaRPr>
+          </a:p>
+          <a:p>
+            <a:pPr>
+              <a:lnSpc>
+                <a:spcPct val="100000"/>
+              </a:lnSpc>
+            </a:pPr>
+            <a:r>
+              <a:rPr b="0" lang="en-CA" sz="1800" spc="-1" strike="noStrike">
+                <a:solidFill>
+                  <a:srgbClr val="000000"/>
+                </a:solidFill>
+                <a:latin typeface="Arial"/>
+                <a:ea typeface="DejaVu Sans"/>
+              </a:rPr>
+              <a:t>4) </a:t>
+            </a:r>
+            <a:r>
+              <a:rPr b="0" lang="en-CA" sz="1800" spc="-1" strike="noStrike">
+                <a:solidFill>
+                  <a:srgbClr val="000000"/>
+                </a:solidFill>
+                <a:latin typeface="Arial"/>
+                <a:ea typeface="DejaVu Sans"/>
+              </a:rPr>
+              <a:t>	</a:t>
+            </a:r>
+            <a:r>
+              <a:rPr b="0" lang="en-CA" sz="1800" spc="-1" strike="noStrike">
+                <a:solidFill>
+                  <a:srgbClr val="000000"/>
+                </a:solidFill>
+                <a:latin typeface="Arial"/>
+                <a:ea typeface="DejaVu Sans"/>
+              </a:rPr>
+              <a:t>Click continue</a:t>
+            </a:r>
+            <a:endParaRPr b="0" lang="en-CA" sz="1800" spc="-1" strike="noStrike">
+              <a:latin typeface="Arial"/>
+            </a:endParaRPr>
+          </a:p>
+          <a:p>
+            <a:pPr>
+              <a:lnSpc>
+                <a:spcPct val="100000"/>
+              </a:lnSpc>
+            </a:pPr>
+            <a:endParaRPr b="0" lang="en-CA" sz="1800" spc="-1" strike="noStrike">
+              <a:latin typeface="Arial"/>
+            </a:endParaRPr>
+          </a:p>
+          <a:p>
+            <a:pPr>
+              <a:lnSpc>
+                <a:spcPct val="100000"/>
+              </a:lnSpc>
+            </a:pPr>
+            <a:r>
+              <a:rPr b="0" lang="en-CA" sz="1800" spc="-1" strike="noStrike">
+                <a:solidFill>
+                  <a:srgbClr val="000000"/>
+                </a:solidFill>
+                <a:latin typeface="Arial"/>
+                <a:ea typeface="DejaVu Sans"/>
+              </a:rPr>
+              <a:t>5)</a:t>
+            </a:r>
+            <a:r>
+              <a:rPr b="0" lang="en-CA" sz="1800" spc="-1" strike="noStrike">
+                <a:solidFill>
+                  <a:srgbClr val="000000"/>
+                </a:solidFill>
+                <a:latin typeface="Arial"/>
+                <a:ea typeface="DejaVu Sans"/>
+              </a:rPr>
+              <a:t>	</a:t>
+            </a:r>
+            <a:r>
+              <a:rPr b="0" lang="en-CA" sz="1800" spc="-1" strike="noStrike">
+                <a:solidFill>
+                  <a:srgbClr val="000000"/>
+                </a:solidFill>
+                <a:latin typeface="Arial"/>
+                <a:ea typeface="DejaVu Sans"/>
+              </a:rPr>
+              <a:t>Fill out that form</a:t>
+            </a:r>
+            <a:endParaRPr b="0" lang="en-CA" sz="1800" spc="-1" strike="noStrike">
+              <a:latin typeface="Arial"/>
+            </a:endParaRPr>
+          </a:p>
+          <a:p>
+            <a:pPr>
+              <a:lnSpc>
+                <a:spcPct val="100000"/>
+              </a:lnSpc>
+            </a:pPr>
+            <a:endParaRPr b="0" lang="en-CA" sz="1800" spc="-1" strike="noStrike">
+              <a:latin typeface="Arial"/>
+            </a:endParaRPr>
+          </a:p>
+          <a:p>
+            <a:pPr>
+              <a:lnSpc>
+                <a:spcPct val="100000"/>
+              </a:lnSpc>
+            </a:pPr>
+            <a:r>
+              <a:rPr b="0" lang="en-CA" sz="1800" spc="-1" strike="noStrike">
+                <a:solidFill>
+                  <a:srgbClr val="000000"/>
+                </a:solidFill>
+                <a:latin typeface="Arial"/>
+                <a:ea typeface="DejaVu Sans"/>
+              </a:rPr>
+              <a:t>6)</a:t>
+            </a:r>
+            <a:r>
+              <a:rPr b="0" lang="en-CA" sz="1800" spc="-1" strike="noStrike">
+                <a:solidFill>
+                  <a:srgbClr val="000000"/>
+                </a:solidFill>
+                <a:latin typeface="Arial"/>
+                <a:ea typeface="DejaVu Sans"/>
+              </a:rPr>
+              <a:t>	</a:t>
+            </a:r>
+            <a:r>
+              <a:rPr b="0" lang="en-CA" sz="1800" spc="-1" strike="noStrike">
+                <a:solidFill>
+                  <a:srgbClr val="000000"/>
+                </a:solidFill>
+                <a:latin typeface="Arial"/>
+                <a:ea typeface="DejaVu Sans"/>
+              </a:rPr>
+              <a:t>Click Create Account and Continue</a:t>
+            </a:r>
+            <a:endParaRPr b="0" lang="en-CA" sz="1800" spc="-1" strike="noStrike">
+              <a:latin typeface="Arial"/>
+            </a:endParaRPr>
+          </a:p>
+          <a:p>
+            <a:pPr>
+              <a:lnSpc>
+                <a:spcPct val="100000"/>
+              </a:lnSpc>
+            </a:pPr>
+            <a:endParaRPr b="0" lang="en-CA" sz="1800" spc="-1" strike="noStrike">
+              <a:latin typeface="Arial"/>
+            </a:endParaRPr>
+          </a:p>
+          <a:p>
+            <a:pPr>
+              <a:lnSpc>
+                <a:spcPct val="100000"/>
+              </a:lnSpc>
+            </a:pPr>
+            <a:endParaRPr b="0" lang="en-CA" sz="1800" spc="-1" strike="noStrike">
+              <a:latin typeface="Arial"/>
+            </a:endParaRPr>
+          </a:p>
+          <a:p>
+            <a:pPr>
+              <a:lnSpc>
+                <a:spcPct val="100000"/>
+              </a:lnSpc>
+            </a:pPr>
+            <a:endParaRPr b="0" lang="en-CA" sz="1800" spc="-1" strike="noStrike">
+              <a:latin typeface="Arial"/>
+            </a:endParaRPr>
+          </a:p>
+        </p:txBody>
+      </p:sp>
+    </p:spTree>
+  </p:cSld>
+  <p:timing>
+    <p:tnLst>
+      <p:par>
+        <p:cTn id="49" dur="indefinite" restart="never" nodeType="tmRoot">
+          <p:childTnLst>
+            <p:seq>
+              <p:cTn id="50" dur="indefinite" nodeType="mainSeq"/>
+              <p:prevCondLst>
+                <p:cond delay="0" evt="onPrev">
+                  <p:tgtEl>
+                    <p:sldTgt/>
+                  </p:tgtEl>
+                </p:cond>
+              </p:prevCondLst>
+              <p:nextCondLst>
+                <p:cond delay="0" evt="onNext">
+                  <p:tgtEl>
+                    <p:sldTgt/>
+                  </p:tgtEl>
+                </p:cond>
+              </p:nextCondLst>
+            </p:seq>
+          </p:childTnLst>
+        </p:cTn>
+      </p:par>
+    </p:tnLst>
+  </p:timing>
+</p:sld>
+</file>
+
+<file path=ppt/slides/slide26.xml><?xml version="1.0" encoding="utf-8"?>
+<p:sld xmlns:a="http://schemas.openxmlformats.org/drawingml/2006/main" xmlns:p="http://schemas.openxmlformats.org/presentationml/2006/main" xmlns:r="http://schemas.openxmlformats.org/officeDocument/2006/relationships" xmlns:p14="http://schemas.microsoft.com/office/powerpoint/2010/main" xmlns:p15="http://schemas.microsoft.com/office/powerpoint/2012/main" xmlns:mc="http://schemas.openxmlformats.org/markup-compatibility/2006">
+  <p:cSld>
+    <p:bg>
+      <p:bgPr>
+        <a:solidFill>
+          <a:srgbClr val="f2f2f2"/>
+        </a:solidFill>
+      </p:bgPr>
+    </p:bg>
+    <p:spTree>
+      <p:nvGrpSpPr>
+        <p:cNvPr id="1" name=""/>
+        <p:cNvGrpSpPr/>
+        <p:nvPr/>
+      </p:nvGrpSpPr>
+      <p:grpSpPr>
+        <a:xfrm>
+          <a:off x="0" y="0"/>
+          <a:ext cx="0" cy="0"/>
+          <a:chOff x="0" y="0"/>
+          <a:chExt cx="0" cy="0"/>
+        </a:xfrm>
+      </p:grpSpPr>
+      <p:sp>
+        <p:nvSpPr>
+          <p:cNvPr id="259" name="CustomShape 1"/>
+          <p:cNvSpPr/>
+          <p:nvPr/>
+        </p:nvSpPr>
+        <p:spPr>
+          <a:xfrm>
+            <a:off x="504000" y="1269360"/>
+            <a:ext cx="8274600" cy="5214600"/>
+          </a:xfrm>
+          <a:prstGeom prst="rect">
+            <a:avLst/>
+          </a:prstGeom>
+          <a:noFill/>
+          <a:ln>
+            <a:noFill/>
+          </a:ln>
+        </p:spPr>
+        <p:style>
+          <a:lnRef idx="0"/>
+          <a:fillRef idx="0"/>
+          <a:effectRef idx="0"/>
+          <a:fontRef idx="minor"/>
+        </p:style>
+        <p:txBody>
+          <a:bodyPr lIns="90000" rIns="90000" tIns="45000" bIns="45000" anchor="ctr">
+            <a:normAutofit/>
+          </a:bodyPr>
+          <a:p>
+            <a:pPr>
+              <a:lnSpc>
+                <a:spcPct val="100000"/>
+              </a:lnSpc>
+            </a:pPr>
+            <a:r>
+              <a:rPr b="1" lang="en-CA" sz="1800" spc="-1" strike="noStrike">
+                <a:solidFill>
+                  <a:srgbClr val="000000"/>
+                </a:solidFill>
+                <a:latin typeface="Arial"/>
+                <a:ea typeface="DejaVu Sans"/>
+              </a:rPr>
+              <a:t>Setting up our AWS Account (continued: )</a:t>
+            </a:r>
+            <a:endParaRPr b="0" lang="en-CA" sz="1800" spc="-1" strike="noStrike">
+              <a:latin typeface="Arial"/>
+            </a:endParaRPr>
+          </a:p>
+          <a:p>
+            <a:pPr>
+              <a:lnSpc>
+                <a:spcPct val="100000"/>
+              </a:lnSpc>
+            </a:pPr>
+            <a:endParaRPr b="0" lang="en-CA" sz="1800" spc="-1" strike="noStrike">
+              <a:latin typeface="Arial"/>
+            </a:endParaRPr>
+          </a:p>
+          <a:p>
+            <a:pPr>
+              <a:lnSpc>
+                <a:spcPct val="100000"/>
+              </a:lnSpc>
+            </a:pPr>
+            <a:r>
+              <a:rPr b="0" lang="en-CA" sz="1800" spc="-1" strike="noStrike">
+                <a:solidFill>
+                  <a:srgbClr val="000000"/>
+                </a:solidFill>
+                <a:latin typeface="Arial"/>
+                <a:ea typeface="DejaVu Sans"/>
+              </a:rPr>
+              <a:t>7) </a:t>
+            </a:r>
+            <a:r>
+              <a:rPr b="0" lang="en-CA" sz="1800" spc="-1" strike="noStrike">
+                <a:solidFill>
+                  <a:srgbClr val="000000"/>
+                </a:solidFill>
+                <a:latin typeface="Arial"/>
+                <a:ea typeface="DejaVu Sans"/>
+              </a:rPr>
+              <a:t>	</a:t>
+            </a:r>
+            <a:r>
+              <a:rPr b="0" lang="en-CA" sz="1800" spc="-1" strike="noStrike">
+                <a:solidFill>
+                  <a:srgbClr val="000000"/>
+                </a:solidFill>
+                <a:latin typeface="Arial"/>
+                <a:ea typeface="DejaVu Sans"/>
+              </a:rPr>
+              <a:t>Fill out the credit card information:</a:t>
+            </a:r>
+            <a:endParaRPr b="0" lang="en-CA" sz="1800" spc="-1" strike="noStrike">
+              <a:latin typeface="Arial"/>
+            </a:endParaRPr>
+          </a:p>
+          <a:p>
+            <a:pPr>
+              <a:lnSpc>
+                <a:spcPct val="100000"/>
+              </a:lnSpc>
+            </a:pPr>
+            <a:r>
+              <a:rPr b="0" lang="en-CA" sz="1800" spc="-1" strike="noStrike">
+                <a:solidFill>
+                  <a:srgbClr val="000000"/>
+                </a:solidFill>
+                <a:latin typeface="Arial"/>
+                <a:ea typeface="DejaVu Sans"/>
+              </a:rPr>
+              <a:t>8)</a:t>
+            </a:r>
+            <a:r>
+              <a:rPr b="0" lang="en-CA" sz="1800" spc="-1" strike="noStrike">
+                <a:solidFill>
+                  <a:srgbClr val="000000"/>
+                </a:solidFill>
+                <a:latin typeface="Arial"/>
+                <a:ea typeface="DejaVu Sans"/>
+              </a:rPr>
+              <a:t>	</a:t>
+            </a:r>
+            <a:r>
+              <a:rPr b="0" lang="en-CA" sz="1800" spc="-1" strike="noStrike">
+                <a:solidFill>
+                  <a:srgbClr val="000000"/>
+                </a:solidFill>
+                <a:latin typeface="Arial"/>
+                <a:ea typeface="DejaVu Sans"/>
+              </a:rPr>
+              <a:t>Log in to the aws console with the account id and password </a:t>
+            </a:r>
+            <a:endParaRPr b="0" lang="en-CA" sz="1800" spc="-1" strike="noStrike">
+              <a:latin typeface="Arial"/>
+            </a:endParaRPr>
+          </a:p>
+          <a:p>
+            <a:pPr>
+              <a:lnSpc>
+                <a:spcPct val="100000"/>
+              </a:lnSpc>
+            </a:pPr>
+            <a:r>
+              <a:rPr b="0" lang="en-CA" sz="1800" spc="-1" strike="noStrike">
+                <a:solidFill>
+                  <a:srgbClr val="000000"/>
+                </a:solidFill>
+                <a:latin typeface="Arial"/>
+                <a:ea typeface="DejaVu Sans"/>
+              </a:rPr>
+              <a:t>	</a:t>
+            </a:r>
+            <a:r>
+              <a:rPr b="0" lang="en-CA" sz="1800" spc="-1" strike="noStrike">
+                <a:solidFill>
+                  <a:srgbClr val="000000"/>
+                </a:solidFill>
+                <a:latin typeface="Arial"/>
+                <a:ea typeface="DejaVu Sans"/>
+              </a:rPr>
+              <a:t>we just created.</a:t>
+            </a:r>
+            <a:endParaRPr b="0" lang="en-CA" sz="1800" spc="-1" strike="noStrike">
+              <a:latin typeface="Arial"/>
+            </a:endParaRPr>
+          </a:p>
+          <a:p>
+            <a:pPr>
+              <a:lnSpc>
+                <a:spcPct val="100000"/>
+              </a:lnSpc>
+            </a:pPr>
+            <a:endParaRPr b="0" lang="en-CA" sz="1800" spc="-1" strike="noStrike">
+              <a:latin typeface="Arial"/>
+            </a:endParaRPr>
+          </a:p>
+          <a:p>
+            <a:pPr>
+              <a:lnSpc>
+                <a:spcPct val="100000"/>
+              </a:lnSpc>
+            </a:pPr>
+            <a:r>
+              <a:rPr b="0" lang="en-CA" sz="1800" spc="-1" strike="noStrike">
+                <a:solidFill>
+                  <a:srgbClr val="000000"/>
+                </a:solidFill>
+                <a:latin typeface="Arial"/>
+                <a:ea typeface="DejaVu Sans"/>
+              </a:rPr>
+              <a:t>	</a:t>
+            </a:r>
+            <a:r>
+              <a:rPr b="0" lang="en-CA" sz="1800" spc="-1" strike="noStrike">
+                <a:solidFill>
+                  <a:srgbClr val="000000"/>
+                </a:solidFill>
+                <a:latin typeface="Arial"/>
+                <a:ea typeface="DejaVu Sans"/>
+              </a:rPr>
+              <a:t>email we chose</a:t>
+            </a:r>
+            <a:endParaRPr b="0" lang="en-CA" sz="1800" spc="-1" strike="noStrike">
+              <a:latin typeface="Arial"/>
+            </a:endParaRPr>
+          </a:p>
+          <a:p>
+            <a:pPr>
+              <a:lnSpc>
+                <a:spcPct val="100000"/>
+              </a:lnSpc>
+            </a:pPr>
+            <a:r>
+              <a:rPr b="0" lang="en-CA" sz="1800" spc="-1" strike="noStrike">
+                <a:solidFill>
+                  <a:srgbClr val="000000"/>
+                </a:solidFill>
+                <a:latin typeface="Arial"/>
+                <a:ea typeface="DejaVu Sans"/>
+              </a:rPr>
+              <a:t>	</a:t>
+            </a:r>
+            <a:r>
+              <a:rPr b="0" lang="en-CA" sz="1800" spc="-1" strike="noStrike">
+                <a:solidFill>
+                  <a:srgbClr val="000000"/>
+                </a:solidFill>
+                <a:latin typeface="Arial"/>
+                <a:ea typeface="DejaVu Sans"/>
+              </a:rPr>
+              <a:t>password we chose </a:t>
+            </a:r>
+            <a:endParaRPr b="0" lang="en-CA" sz="1800" spc="-1" strike="noStrike">
+              <a:latin typeface="Arial"/>
+            </a:endParaRPr>
+          </a:p>
+          <a:p>
+            <a:pPr>
+              <a:lnSpc>
+                <a:spcPct val="100000"/>
+              </a:lnSpc>
+            </a:pPr>
+            <a:endParaRPr b="0" lang="en-CA" sz="1800" spc="-1" strike="noStrike">
+              <a:latin typeface="Arial"/>
+            </a:endParaRPr>
+          </a:p>
+          <a:p>
+            <a:pPr>
+              <a:lnSpc>
+                <a:spcPct val="100000"/>
+              </a:lnSpc>
+            </a:pPr>
+            <a:r>
+              <a:rPr b="0" lang="en-CA" sz="1800" spc="-1" strike="noStrike">
+                <a:solidFill>
+                  <a:srgbClr val="000000"/>
+                </a:solidFill>
+                <a:latin typeface="Arial"/>
+                <a:ea typeface="DejaVu Sans"/>
+              </a:rPr>
+              <a:t>	</a:t>
+            </a:r>
+            <a:r>
+              <a:rPr b="0" lang="en-CA" sz="1800" spc="-1" strike="noStrike">
+                <a:solidFill>
+                  <a:srgbClr val="000000"/>
+                </a:solidFill>
+                <a:latin typeface="Arial"/>
+                <a:ea typeface="DejaVu Sans"/>
+              </a:rPr>
+              <a:t>resource to install:</a:t>
+            </a:r>
+            <a:endParaRPr b="0" lang="en-CA" sz="1800" spc="-1" strike="noStrike">
+              <a:latin typeface="Arial"/>
+            </a:endParaRPr>
+          </a:p>
+          <a:p>
+            <a:pPr>
+              <a:lnSpc>
+                <a:spcPct val="100000"/>
+              </a:lnSpc>
+            </a:pPr>
+            <a:endParaRPr b="0" lang="en-CA" sz="1800" spc="-1" strike="noStrike">
+              <a:latin typeface="Arial"/>
+            </a:endParaRPr>
+          </a:p>
+          <a:p>
+            <a:pPr>
+              <a:lnSpc>
+                <a:spcPct val="100000"/>
+              </a:lnSpc>
+            </a:pPr>
+            <a:r>
+              <a:rPr b="0" lang="en-CA" sz="1800" spc="-1" strike="noStrike">
+                <a:solidFill>
+                  <a:srgbClr val="000000"/>
+                </a:solidFill>
+                <a:latin typeface="Arial"/>
+                <a:ea typeface="DejaVu Sans"/>
+              </a:rPr>
+              <a:t>	</a:t>
+            </a:r>
+            <a:r>
+              <a:rPr b="0" lang="en-CA" sz="1800" spc="-1" strike="noStrike" u="sng">
+                <a:solidFill>
+                  <a:srgbClr val="0000ff"/>
+                </a:solidFill>
+                <a:uFillTx/>
+                <a:latin typeface="Arial"/>
+                <a:ea typeface="DejaVu Sans"/>
+                <a:hlinkClick r:id="rId1"/>
+              </a:rPr>
+              <a:t> https://www.youtube.com/watch?v=XhW17g73fvY</a:t>
+            </a:r>
+            <a:endParaRPr b="0" lang="en-CA" sz="1800" spc="-1" strike="noStrike">
+              <a:latin typeface="Arial"/>
+            </a:endParaRPr>
+          </a:p>
+          <a:p>
+            <a:pPr>
+              <a:lnSpc>
+                <a:spcPct val="100000"/>
+              </a:lnSpc>
+            </a:pPr>
+            <a:endParaRPr b="0" lang="en-CA" sz="1800" spc="-1" strike="noStrike">
+              <a:latin typeface="Arial"/>
+            </a:endParaRPr>
+          </a:p>
+          <a:p>
+            <a:pPr>
+              <a:lnSpc>
+                <a:spcPct val="100000"/>
+              </a:lnSpc>
+            </a:pPr>
+            <a:endParaRPr b="0" lang="en-CA" sz="1800" spc="-1" strike="noStrike">
+              <a:latin typeface="Arial"/>
+            </a:endParaRPr>
+          </a:p>
+          <a:p>
+            <a:pPr>
+              <a:lnSpc>
+                <a:spcPct val="100000"/>
+              </a:lnSpc>
+            </a:pPr>
+            <a:r>
+              <a:rPr b="0" lang="en-CA" sz="1800" spc="-1" strike="noStrike">
+                <a:solidFill>
+                  <a:srgbClr val="000000"/>
+                </a:solidFill>
+                <a:latin typeface="Arial"/>
+                <a:ea typeface="DejaVu Sans"/>
+              </a:rPr>
+              <a:t>	</a:t>
+            </a:r>
+            <a:endParaRPr b="0" lang="en-CA" sz="1800" spc="-1" strike="noStrike">
+              <a:latin typeface="Arial"/>
+            </a:endParaRPr>
+          </a:p>
+          <a:p>
+            <a:pPr>
+              <a:lnSpc>
+                <a:spcPct val="100000"/>
+              </a:lnSpc>
+            </a:pPr>
+            <a:endParaRPr b="0" lang="en-CA" sz="1800" spc="-1" strike="noStrike">
+              <a:latin typeface="Arial"/>
+            </a:endParaRPr>
+          </a:p>
+          <a:p>
+            <a:pPr>
+              <a:lnSpc>
+                <a:spcPct val="100000"/>
+              </a:lnSpc>
+            </a:pPr>
+            <a:endParaRPr b="0" lang="en-CA" sz="1800" spc="-1" strike="noStrike">
+              <a:latin typeface="Arial"/>
+            </a:endParaRPr>
+          </a:p>
+          <a:p>
+            <a:pPr>
+              <a:lnSpc>
+                <a:spcPct val="100000"/>
+              </a:lnSpc>
+            </a:pPr>
+            <a:r>
+              <a:rPr b="0" lang="en-CA" sz="1050" spc="-1" strike="noStrike">
+                <a:solidFill>
+                  <a:srgbClr val="000000"/>
+                </a:solidFill>
+                <a:latin typeface="Arial"/>
+                <a:ea typeface="DejaVu Sans"/>
+              </a:rPr>
+              <a:t>	</a:t>
+            </a:r>
+            <a:r>
+              <a:rPr b="0" lang="en-CA" sz="1050" spc="-1" strike="noStrike">
+                <a:solidFill>
+                  <a:srgbClr val="000000"/>
+                </a:solidFill>
+                <a:latin typeface="Arial"/>
+                <a:ea typeface="DejaVu Sans"/>
+              </a:rPr>
+              <a:t>	</a:t>
+            </a:r>
+            <a:r>
+              <a:rPr b="0" lang="en-CA" sz="1050" spc="-1" strike="noStrike">
+                <a:solidFill>
+                  <a:srgbClr val="000000"/>
+                </a:solidFill>
+                <a:latin typeface="Arial"/>
+                <a:ea typeface="DejaVu Sans"/>
+              </a:rPr>
+              <a:t>            </a:t>
+            </a:r>
+            <a:endParaRPr b="0" lang="en-CA" sz="1050" spc="-1" strike="noStrike">
+              <a:latin typeface="Arial"/>
+            </a:endParaRPr>
+          </a:p>
+        </p:txBody>
+      </p:sp>
+      <p:sp>
+        <p:nvSpPr>
+          <p:cNvPr id="260" name="CustomShape 2"/>
+          <p:cNvSpPr/>
+          <p:nvPr/>
+        </p:nvSpPr>
+        <p:spPr>
+          <a:xfrm>
+            <a:off x="432000" y="0"/>
+            <a:ext cx="7446960" cy="1179000"/>
+          </a:xfrm>
+          <a:prstGeom prst="rect">
+            <a:avLst/>
+          </a:prstGeom>
+          <a:noFill/>
+          <a:ln>
+            <a:noFill/>
+          </a:ln>
+        </p:spPr>
+        <p:style>
+          <a:lnRef idx="0"/>
+          <a:fillRef idx="0"/>
+          <a:effectRef idx="0"/>
+          <a:fontRef idx="minor"/>
+        </p:style>
+        <p:txBody>
+          <a:bodyPr lIns="90000" rIns="90000" tIns="45000" bIns="45000" anchor="ctr">
+            <a:normAutofit/>
+          </a:bodyPr>
+          <a:p>
+            <a:pPr>
+              <a:lnSpc>
+                <a:spcPct val="100000"/>
+              </a:lnSpc>
+            </a:pPr>
+            <a:r>
+              <a:rPr b="0" lang="en-CA" sz="3000" spc="-1" strike="noStrike" cap="all">
+                <a:solidFill>
+                  <a:srgbClr val="292929"/>
+                </a:solidFill>
+                <a:latin typeface="Nexa Bold"/>
+                <a:ea typeface="DejaVu Sans"/>
+              </a:rPr>
+              <a:t>Installing our</a:t>
+            </a:r>
+            <a:r>
+              <a:rPr b="0" lang="en-CA" sz="3000" spc="-1" strike="noStrike">
+                <a:solidFill>
+                  <a:srgbClr val="292929"/>
+                </a:solidFill>
+                <a:latin typeface="Nexa Bold"/>
+                <a:ea typeface="DejaVu Sans"/>
+              </a:rPr>
+              <a:t> </a:t>
+            </a:r>
+            <a:r>
+              <a:rPr b="0" lang="en-CA" sz="3000" spc="-1" strike="noStrike" cap="all">
+                <a:solidFill>
+                  <a:srgbClr val="1fa0be"/>
+                </a:solidFill>
+                <a:latin typeface="Nexa Bold"/>
+                <a:ea typeface="DejaVu Sans"/>
+              </a:rPr>
+              <a:t>Stack</a:t>
+            </a:r>
+            <a:endParaRPr b="0" lang="en-CA" sz="3000" spc="-1" strike="noStrike">
+              <a:latin typeface="Arial"/>
+            </a:endParaRPr>
+          </a:p>
+        </p:txBody>
+      </p:sp>
+      <p:sp>
+        <p:nvSpPr>
+          <p:cNvPr id="261" name="CustomShape 3"/>
+          <p:cNvSpPr/>
+          <p:nvPr/>
+        </p:nvSpPr>
+        <p:spPr>
+          <a:xfrm>
+            <a:off x="0" y="0"/>
+            <a:ext cx="246240" cy="1191240"/>
+          </a:xfrm>
+          <a:prstGeom prst="rect">
+            <a:avLst/>
+          </a:prstGeom>
+          <a:solidFill>
+            <a:srgbClr val="146e83"/>
+          </a:solidFill>
+          <a:ln>
+            <a:round/>
+          </a:ln>
+        </p:spPr>
+        <p:style>
+          <a:lnRef idx="2">
+            <a:schemeClr val="accent1">
+              <a:shade val="50000"/>
+            </a:schemeClr>
+          </a:lnRef>
+          <a:fillRef idx="1">
+            <a:schemeClr val="accent1"/>
+          </a:fillRef>
+          <a:effectRef idx="0">
+            <a:schemeClr val="accent1"/>
+          </a:effectRef>
+          <a:fontRef idx="minor"/>
+        </p:style>
+      </p:sp>
+      <p:sp>
+        <p:nvSpPr>
+          <p:cNvPr id="262" name="Line 4"/>
+          <p:cNvSpPr/>
+          <p:nvPr/>
+        </p:nvSpPr>
+        <p:spPr>
+          <a:xfrm>
+            <a:off x="251280" y="1196640"/>
+            <a:ext cx="8892720" cy="360"/>
+          </a:xfrm>
+          <a:prstGeom prst="line">
+            <a:avLst/>
+          </a:prstGeom>
+          <a:ln w="22320">
+            <a:solidFill>
+              <a:srgbClr val="146e83"/>
+            </a:solidFill>
+            <a:round/>
+          </a:ln>
+        </p:spPr>
+        <p:style>
+          <a:lnRef idx="1">
+            <a:schemeClr val="accent1"/>
+          </a:lnRef>
+          <a:fillRef idx="0">
+            <a:schemeClr val="accent1"/>
+          </a:fillRef>
+          <a:effectRef idx="0">
+            <a:schemeClr val="accent1"/>
+          </a:effectRef>
+          <a:fontRef idx="minor"/>
+        </p:style>
+      </p:sp>
+    </p:spTree>
+  </p:cSld>
+  <p:timing>
+    <p:tnLst>
+      <p:par>
+        <p:cTn id="51" dur="indefinite" restart="never" nodeType="tmRoot">
+          <p:childTnLst>
+            <p:seq>
+              <p:cTn id="52" dur="indefinite" nodeType="mainSeq"/>
               <p:prevCondLst>
                 <p:cond delay="0" evt="onPrev">
                   <p:tgtEl>
@@ -13260,7 +14022,7 @@
         <p:spPr>
           <a:xfrm>
             <a:off x="432000" y="13680"/>
-            <a:ext cx="7448040" cy="1180080"/>
+            <a:ext cx="7446960" cy="1179000"/>
           </a:xfrm>
           <a:prstGeom prst="rect">
             <a:avLst/>
@@ -13331,7 +14093,7 @@
         <p:spPr>
           <a:xfrm>
             <a:off x="0" y="0"/>
-            <a:ext cx="247320" cy="1192320"/>
+            <a:ext cx="246240" cy="1191240"/>
           </a:xfrm>
           <a:prstGeom prst="rect">
             <a:avLst/>
@@ -13401,7 +14163,7 @@
         <p:spPr>
           <a:xfrm>
             <a:off x="457200" y="273600"/>
-            <a:ext cx="8226360" cy="5304960"/>
+            <a:ext cx="8225280" cy="5303880"/>
           </a:xfrm>
           <a:prstGeom prst="rect">
             <a:avLst/>
@@ -13450,7 +14212,7 @@
         <p:spPr>
           <a:xfrm>
             <a:off x="576000" y="1728000"/>
-            <a:ext cx="6765120" cy="2391120"/>
+            <a:ext cx="6764040" cy="2390040"/>
           </a:xfrm>
           <a:prstGeom prst="rect">
             <a:avLst/>
@@ -13535,15 +14297,36 @@
               <a:t>	</a:t>
             </a:r>
             <a:r>
+              <a:rPr b="0" lang="en-CA" sz="1800" spc="-1" strike="noStrike" u="sng">
+                <a:solidFill>
+                  <a:srgbClr val="0000ff"/>
+                </a:solidFill>
+                <a:uFillTx/>
+                <a:latin typeface="Arial"/>
+                <a:ea typeface="DejaVu Sans"/>
+                <a:hlinkClick r:id="rId1"/>
+              </a:rPr>
+              <a:t> https://www.youtube.com/watch?v=yIVXjl4SwVo</a:t>
+            </a:r>
+            <a:endParaRPr b="0" lang="en-CA" sz="1800" spc="-1" strike="noStrike">
+              <a:latin typeface="Arial"/>
+            </a:endParaRPr>
+          </a:p>
+          <a:p>
+            <a:pPr>
+              <a:lnSpc>
+                <a:spcPct val="100000"/>
+              </a:lnSpc>
+            </a:pPr>
+            <a:r>
               <a:rPr b="0" lang="en-CA" sz="1800" spc="-1" strike="noStrike">
                 <a:solidFill>
                   <a:srgbClr val="000000"/>
                 </a:solidFill>
                 <a:latin typeface="Arial"/>
                 <a:ea typeface="DejaVu Sans"/>
-                <a:hlinkClick r:id="rId1"/>
-              </a:rPr>
-              <a:t> https://www.youtube.com/watch?v=yIVXjl4SwVo</a:t>
+              </a:rPr>
+              <a:t>	</a:t>
             </a:r>
             <a:endParaRPr b="0" lang="en-CA" sz="1800" spc="-1" strike="noStrike">
               <a:latin typeface="Arial"/>
@@ -13563,7 +14346,7 @@
                 <a:latin typeface="Arial"/>
                 <a:ea typeface="DejaVu Sans"/>
               </a:rPr>
-              <a:t>	</a:t>
+              <a:t>2) What is virtual box:</a:t>
             </a:r>
             <a:endParaRPr b="0" lang="en-CA" sz="1800" spc="-1" strike="noStrike">
               <a:latin typeface="Arial"/>
@@ -13575,16 +14358,6 @@
                 <a:spcPct val="100000"/>
               </a:lnSpc>
             </a:pPr>
-            <a:r>
-              <a:rPr b="0" lang="en-CA" sz="1800" spc="-1" strike="noStrike">
-                <a:solidFill>
-                  <a:srgbClr val="000000"/>
-                </a:solidFill>
-                <a:latin typeface="Arial"/>
-                <a:ea typeface="DejaVu Sans"/>
-              </a:rPr>
-              <a:t>2) What is virtual box:</a:t>
-            </a:r>
             <a:endParaRPr b="0" lang="en-CA" sz="1800" spc="-1" strike="noStrike">
               <a:latin typeface="Arial"/>
             </a:endParaRPr>
@@ -13595,21 +14368,12 @@
                 <a:spcPct val="100000"/>
               </a:lnSpc>
             </a:pPr>
-            <a:endParaRPr b="0" lang="en-CA" sz="1800" spc="-1" strike="noStrike">
-              <a:latin typeface="Arial"/>
-            </a:endParaRPr>
-          </a:p>
-          <a:p>
-            <a:pPr>
-              <a:lnSpc>
-                <a:spcPct val="100000"/>
-              </a:lnSpc>
-            </a:pPr>
-            <a:r>
-              <a:rPr b="0" lang="en-CA" sz="1800" spc="-1" strike="noStrike">
-                <a:solidFill>
-                  <a:srgbClr val="000000"/>
-                </a:solidFill>
+            <a:r>
+              <a:rPr b="0" lang="en-CA" sz="1800" spc="-1" strike="noStrike" u="sng">
+                <a:solidFill>
+                  <a:srgbClr val="0000ff"/>
+                </a:solidFill>
+                <a:uFillTx/>
                 <a:latin typeface="Arial"/>
                 <a:ea typeface="DejaVu Sans"/>
                 <a:hlinkClick r:id="rId2"/>
@@ -13707,7 +14471,7 @@
         <p:spPr>
           <a:xfrm>
             <a:off x="432000" y="13680"/>
-            <a:ext cx="7448040" cy="1180080"/>
+            <a:ext cx="7446960" cy="1179000"/>
           </a:xfrm>
           <a:prstGeom prst="rect">
             <a:avLst/>
@@ -13778,7 +14542,7 @@
         <p:spPr>
           <a:xfrm>
             <a:off x="0" y="0"/>
-            <a:ext cx="247320" cy="1192320"/>
+            <a:ext cx="246240" cy="1191240"/>
           </a:xfrm>
           <a:prstGeom prst="rect">
             <a:avLst/>
@@ -13848,7 +14612,7 @@
         <p:spPr>
           <a:xfrm>
             <a:off x="457200" y="273600"/>
-            <a:ext cx="8226360" cy="5304960"/>
+            <a:ext cx="8225280" cy="5303880"/>
           </a:xfrm>
           <a:prstGeom prst="rect">
             <a:avLst/>
@@ -13897,7 +14661,7 @@
         <p:spPr>
           <a:xfrm>
             <a:off x="576000" y="1728000"/>
-            <a:ext cx="6765120" cy="2391120"/>
+            <a:ext cx="6764040" cy="2390040"/>
           </a:xfrm>
           <a:prstGeom prst="rect">
             <a:avLst/>
@@ -13946,7 +14710,7 @@
             </a:endParaRPr>
           </a:p>
           <a:p>
-            <a:pPr marL="216000" indent="-213120">
+            <a:pPr marL="216000" indent="-212040">
               <a:lnSpc>
                 <a:spcPct val="100000"/>
               </a:lnSpc>
@@ -13982,7 +14746,7 @@
             </a:endParaRPr>
           </a:p>
           <a:p>
-            <a:pPr lvl="1" marL="432000" indent="-215280">
+            <a:pPr lvl="1" marL="432000" indent="-214200">
               <a:lnSpc>
                 <a:spcPct val="100000"/>
               </a:lnSpc>
@@ -14008,7 +14772,7 @@
             </a:endParaRPr>
           </a:p>
           <a:p>
-            <a:pPr lvl="2" marL="648000" indent="-215280">
+            <a:pPr lvl="2" marL="648000" indent="-214200">
               <a:lnSpc>
                 <a:spcPct val="100000"/>
               </a:lnSpc>
@@ -14054,7 +14818,7 @@
             </a:endParaRPr>
           </a:p>
           <a:p>
-            <a:pPr lvl="4" marL="1080000" indent="-215280">
+            <a:pPr lvl="4" marL="1080000" indent="-214200">
               <a:lnSpc>
                 <a:spcPct val="100000"/>
               </a:lnSpc>
@@ -14082,7 +14846,7 @@
             </a:endParaRPr>
           </a:p>
           <a:p>
-            <a:pPr lvl="2" marL="648000" indent="-215280">
+            <a:pPr lvl="2" marL="648000" indent="-214200">
               <a:lnSpc>
                 <a:spcPct val="100000"/>
               </a:lnSpc>
@@ -14128,7 +14892,7 @@
             </a:endParaRPr>
           </a:p>
           <a:p>
-            <a:pPr lvl="2" marL="648000" indent="-215280">
+            <a:pPr lvl="2" marL="648000" indent="-214200">
               <a:lnSpc>
                 <a:spcPct val="100000"/>
               </a:lnSpc>
@@ -14174,7 +14938,7 @@
             </a:endParaRPr>
           </a:p>
           <a:p>
-            <a:pPr lvl="2" marL="648000" indent="-215280">
+            <a:pPr lvl="2" marL="648000" indent="-214200">
               <a:lnSpc>
                 <a:spcPct val="100000"/>
               </a:lnSpc>
@@ -14220,7 +14984,7 @@
             </a:endParaRPr>
           </a:p>
           <a:p>
-            <a:pPr lvl="2" marL="648000" indent="-215280">
+            <a:pPr lvl="2" marL="648000" indent="-214200">
               <a:lnSpc>
                 <a:spcPct val="100000"/>
               </a:lnSpc>
@@ -14266,7 +15030,7 @@
             </a:endParaRPr>
           </a:p>
           <a:p>
-            <a:pPr lvl="2" marL="648000" indent="-215280">
+            <a:pPr lvl="2" marL="648000" indent="-214200">
               <a:lnSpc>
                 <a:spcPct val="100000"/>
               </a:lnSpc>
@@ -14312,7 +15076,7 @@
             </a:endParaRPr>
           </a:p>
           <a:p>
-            <a:pPr lvl="4" marL="1080000" indent="-215280">
+            <a:pPr lvl="4" marL="1080000" indent="-214200">
               <a:lnSpc>
                 <a:spcPct val="100000"/>
               </a:lnSpc>
@@ -14350,7 +15114,7 @@
             </a:endParaRPr>
           </a:p>
           <a:p>
-            <a:pPr lvl="4" marL="1080000" indent="-215280">
+            <a:pPr lvl="4" marL="1080000" indent="-214200">
               <a:lnSpc>
                 <a:spcPct val="100000"/>
               </a:lnSpc>
@@ -14462,7 +15226,7 @@
         <p:spPr>
           <a:xfrm>
             <a:off x="432000" y="13680"/>
-            <a:ext cx="7448040" cy="1180080"/>
+            <a:ext cx="7446960" cy="1179000"/>
           </a:xfrm>
           <a:prstGeom prst="rect">
             <a:avLst/>
@@ -14533,7 +15297,7 @@
         <p:spPr>
           <a:xfrm>
             <a:off x="0" y="0"/>
-            <a:ext cx="247320" cy="1192320"/>
+            <a:ext cx="246240" cy="1191240"/>
           </a:xfrm>
           <a:prstGeom prst="rect">
             <a:avLst/>
@@ -14603,7 +15367,7 @@
         <p:spPr>
           <a:xfrm>
             <a:off x="457200" y="273600"/>
-            <a:ext cx="8226360" cy="5304960"/>
+            <a:ext cx="8225280" cy="5303880"/>
           </a:xfrm>
           <a:prstGeom prst="rect">
             <a:avLst/>
@@ -14652,7 +15416,7 @@
         <p:spPr>
           <a:xfrm>
             <a:off x="576000" y="1728000"/>
-            <a:ext cx="6765120" cy="2391120"/>
+            <a:ext cx="6764040" cy="2390040"/>
           </a:xfrm>
           <a:prstGeom prst="rect">
             <a:avLst/>
@@ -14701,7 +15465,7 @@
             </a:endParaRPr>
           </a:p>
           <a:p>
-            <a:pPr marL="216000" indent="-213120">
+            <a:pPr marL="216000" indent="-212040">
               <a:lnSpc>
                 <a:spcPct val="100000"/>
               </a:lnSpc>
@@ -14737,7 +15501,7 @@
             </a:endParaRPr>
           </a:p>
           <a:p>
-            <a:pPr lvl="1" marL="432000" indent="-215280">
+            <a:pPr lvl="1" marL="432000" indent="-214200">
               <a:lnSpc>
                 <a:spcPct val="100000"/>
               </a:lnSpc>
@@ -14763,7 +15527,7 @@
             </a:endParaRPr>
           </a:p>
           <a:p>
-            <a:pPr lvl="2" marL="648000" indent="-215280">
+            <a:pPr lvl="2" marL="648000" indent="-214200">
               <a:lnSpc>
                 <a:spcPct val="100000"/>
               </a:lnSpc>
@@ -14809,7 +15573,7 @@
             </a:endParaRPr>
           </a:p>
           <a:p>
-            <a:pPr lvl="4" marL="1080000" indent="-215280">
+            <a:pPr lvl="4" marL="1080000" indent="-214200">
               <a:lnSpc>
                 <a:spcPct val="100000"/>
               </a:lnSpc>
@@ -14837,7 +15601,7 @@
             </a:endParaRPr>
           </a:p>
           <a:p>
-            <a:pPr lvl="2" marL="648000" indent="-215280">
+            <a:pPr lvl="2" marL="648000" indent="-214200">
               <a:lnSpc>
                 <a:spcPct val="100000"/>
               </a:lnSpc>
@@ -14883,7 +15647,7 @@
             </a:endParaRPr>
           </a:p>
           <a:p>
-            <a:pPr lvl="2" marL="648000" indent="-215280">
+            <a:pPr lvl="2" marL="648000" indent="-214200">
               <a:lnSpc>
                 <a:spcPct val="100000"/>
               </a:lnSpc>
@@ -14929,7 +15693,7 @@
             </a:endParaRPr>
           </a:p>
           <a:p>
-            <a:pPr lvl="2" marL="648000" indent="-215280">
+            <a:pPr lvl="2" marL="648000" indent="-214200">
               <a:lnSpc>
                 <a:spcPct val="100000"/>
               </a:lnSpc>
@@ -14975,7 +15739,7 @@
             </a:endParaRPr>
           </a:p>
           <a:p>
-            <a:pPr lvl="4" marL="1080000" indent="-215280">
+            <a:pPr lvl="4" marL="1080000" indent="-214200">
               <a:lnSpc>
                 <a:spcPct val="100000"/>
               </a:lnSpc>
@@ -15001,7 +15765,7 @@
             </a:endParaRPr>
           </a:p>
           <a:p>
-            <a:pPr lvl="2" marL="648000" indent="-215280">
+            <a:pPr lvl="2" marL="648000" indent="-214200">
               <a:lnSpc>
                 <a:spcPct val="100000"/>
               </a:lnSpc>
@@ -15047,7 +15811,7 @@
             </a:endParaRPr>
           </a:p>
           <a:p>
-            <a:pPr lvl="4" marL="1080000" indent="-215280">
+            <a:pPr lvl="4" marL="1080000" indent="-214200">
               <a:lnSpc>
                 <a:spcPct val="100000"/>
               </a:lnSpc>
@@ -15171,7 +15935,7 @@
         <p:spPr>
           <a:xfrm>
             <a:off x="432000" y="13680"/>
-            <a:ext cx="7448040" cy="1180080"/>
+            <a:ext cx="7446960" cy="1179000"/>
           </a:xfrm>
           <a:prstGeom prst="rect">
             <a:avLst/>
@@ -15242,7 +16006,7 @@
         <p:spPr>
           <a:xfrm>
             <a:off x="0" y="0"/>
-            <a:ext cx="247320" cy="1192320"/>
+            <a:ext cx="246240" cy="1191240"/>
           </a:xfrm>
           <a:prstGeom prst="rect">
             <a:avLst/>
@@ -15312,7 +16076,7 @@
         <p:spPr>
           <a:xfrm>
             <a:off x="457200" y="273600"/>
-            <a:ext cx="8226360" cy="5304960"/>
+            <a:ext cx="8225280" cy="5303880"/>
           </a:xfrm>
           <a:prstGeom prst="rect">
             <a:avLst/>
@@ -15361,7 +16125,7 @@
         <p:spPr>
           <a:xfrm>
             <a:off x="576000" y="1836000"/>
-            <a:ext cx="6765120" cy="2391120"/>
+            <a:ext cx="6764040" cy="2390040"/>
           </a:xfrm>
           <a:prstGeom prst="rect">
             <a:avLst/>
@@ -15410,7 +16174,7 @@
             </a:endParaRPr>
           </a:p>
           <a:p>
-            <a:pPr marL="216000" indent="-213120">
+            <a:pPr marL="216000" indent="-212040">
               <a:lnSpc>
                 <a:spcPct val="100000"/>
               </a:lnSpc>
@@ -15446,7 +16210,7 @@
             </a:endParaRPr>
           </a:p>
           <a:p>
-            <a:pPr lvl="1" marL="432000" indent="-215280">
+            <a:pPr lvl="1" marL="432000" indent="-214200">
               <a:lnSpc>
                 <a:spcPct val="100000"/>
               </a:lnSpc>
@@ -15472,7 +16236,7 @@
             </a:endParaRPr>
           </a:p>
           <a:p>
-            <a:pPr lvl="2" marL="648000" indent="-215280">
+            <a:pPr lvl="2" marL="648000" indent="-214200">
               <a:lnSpc>
                 <a:spcPct val="100000"/>
               </a:lnSpc>
@@ -15518,7 +16282,7 @@
             </a:endParaRPr>
           </a:p>
           <a:p>
-            <a:pPr lvl="4" marL="1080000" indent="-215280">
+            <a:pPr lvl="4" marL="1080000" indent="-214200">
               <a:lnSpc>
                 <a:spcPct val="100000"/>
               </a:lnSpc>
@@ -15546,7 +16310,7 @@
             </a:endParaRPr>
           </a:p>
           <a:p>
-            <a:pPr lvl="2" marL="648000" indent="-215280">
+            <a:pPr lvl="2" marL="648000" indent="-214200">
               <a:lnSpc>
                 <a:spcPct val="100000"/>
               </a:lnSpc>
@@ -15592,7 +16356,7 @@
             </a:endParaRPr>
           </a:p>
           <a:p>
-            <a:pPr lvl="2" marL="648000" indent="-215280">
+            <a:pPr lvl="2" marL="648000" indent="-214200">
               <a:lnSpc>
                 <a:spcPct val="100000"/>
               </a:lnSpc>
@@ -15638,7 +16402,7 @@
             </a:endParaRPr>
           </a:p>
           <a:p>
-            <a:pPr lvl="2" marL="648000" indent="-215280">
+            <a:pPr lvl="2" marL="648000" indent="-214200">
               <a:lnSpc>
                 <a:spcPct val="100000"/>
               </a:lnSpc>
@@ -15684,7 +16448,7 @@
             </a:endParaRPr>
           </a:p>
           <a:p>
-            <a:pPr lvl="4" marL="1080000" indent="-215280">
+            <a:pPr lvl="4" marL="1080000" indent="-214200">
               <a:lnSpc>
                 <a:spcPct val="100000"/>
               </a:lnSpc>
@@ -15710,7 +16474,7 @@
             </a:endParaRPr>
           </a:p>
           <a:p>
-            <a:pPr lvl="2" marL="648000" indent="-215280">
+            <a:pPr lvl="2" marL="648000" indent="-214200">
               <a:lnSpc>
                 <a:spcPct val="100000"/>
               </a:lnSpc>
@@ -15756,7 +16520,7 @@
             </a:endParaRPr>
           </a:p>
           <a:p>
-            <a:pPr lvl="4" marL="1080000" indent="-215280">
+            <a:pPr lvl="4" marL="1080000" indent="-214200">
               <a:lnSpc>
                 <a:spcPct val="100000"/>
               </a:lnSpc>
@@ -15890,7 +16654,7 @@
         <p:spPr>
           <a:xfrm>
             <a:off x="504000" y="1413360"/>
-            <a:ext cx="8275680" cy="5215680"/>
+            <a:ext cx="8274600" cy="5214600"/>
           </a:xfrm>
           <a:prstGeom prst="rect">
             <a:avLst/>
@@ -15966,10 +16730,11 @@
               </a:spcBef>
             </a:pPr>
             <a:r>
-              <a:rPr b="0" lang="en-CA" sz="2400" spc="-1" strike="noStrike">
-                <a:solidFill>
-                  <a:srgbClr val="000000"/>
-                </a:solidFill>
+              <a:rPr b="0" lang="en-CA" sz="2400" spc="-1" strike="noStrike" u="sng">
+                <a:solidFill>
+                  <a:srgbClr val="0000ff"/>
+                </a:solidFill>
+                <a:uFillTx/>
                 <a:latin typeface="Calibri"/>
                 <a:ea typeface="DejaVu Sans"/>
                 <a:hlinkClick r:id="rId1"/>
@@ -16027,7 +16792,7 @@
         <p:spPr>
           <a:xfrm>
             <a:off x="432000" y="0"/>
-            <a:ext cx="7448040" cy="1180080"/>
+            <a:ext cx="7446960" cy="1179000"/>
           </a:xfrm>
           <a:prstGeom prst="rect">
             <a:avLst/>
@@ -16098,7 +16863,7 @@
         <p:spPr>
           <a:xfrm>
             <a:off x="0" y="0"/>
-            <a:ext cx="247320" cy="1192320"/>
+            <a:ext cx="246240" cy="1191240"/>
           </a:xfrm>
           <a:prstGeom prst="rect">
             <a:avLst/>
@@ -16224,7 +16989,7 @@
         <p:spPr>
           <a:xfrm>
             <a:off x="504000" y="1413360"/>
-            <a:ext cx="8275680" cy="5215680"/>
+            <a:ext cx="8274600" cy="5214600"/>
           </a:xfrm>
           <a:prstGeom prst="rect">
             <a:avLst/>
@@ -16418,7 +17183,7 @@
         <p:spPr>
           <a:xfrm>
             <a:off x="432000" y="0"/>
-            <a:ext cx="7448040" cy="1180080"/>
+            <a:ext cx="7446960" cy="1179000"/>
           </a:xfrm>
           <a:prstGeom prst="rect">
             <a:avLst/>
@@ -16489,7 +17254,7 @@
         <p:spPr>
           <a:xfrm>
             <a:off x="0" y="0"/>
-            <a:ext cx="247320" cy="1192320"/>
+            <a:ext cx="246240" cy="1191240"/>
           </a:xfrm>
           <a:prstGeom prst="rect">
             <a:avLst/>
@@ -16615,7 +17380,7 @@
         <p:spPr>
           <a:xfrm>
             <a:off x="504000" y="1413360"/>
-            <a:ext cx="8275680" cy="5215680"/>
+            <a:ext cx="8274600" cy="5214600"/>
           </a:xfrm>
           <a:prstGeom prst="rect">
             <a:avLst/>
@@ -16855,7 +17620,7 @@
         <p:spPr>
           <a:xfrm>
             <a:off x="432000" y="0"/>
-            <a:ext cx="7448040" cy="1180080"/>
+            <a:ext cx="7446960" cy="1179000"/>
           </a:xfrm>
           <a:prstGeom prst="rect">
             <a:avLst/>
@@ -16926,7 +17691,7 @@
         <p:spPr>
           <a:xfrm>
             <a:off x="0" y="0"/>
-            <a:ext cx="247320" cy="1192320"/>
+            <a:ext cx="246240" cy="1191240"/>
           </a:xfrm>
           <a:prstGeom prst="rect">
             <a:avLst/>

</xml_diff>